<commit_message>
Presentation improvement (Add nuclides migration part)
</commit_message>
<xml_diff>
--- a/practice/presentation/practice.pptx
+++ b/practice/presentation/practice.pptx
@@ -1,9 +1,12 @@
 
 <file path=ppt/presentation.xml><?xml version="1.0" encoding="utf-8"?>
-<p:presentation xmlns:a="http://schemas.openxmlformats.org/drawingml/2006/main" xmlns:r="http://schemas.openxmlformats.org/officeDocument/2006/relationships" xmlns:p="http://schemas.openxmlformats.org/presentationml/2006/main" saveSubsetFonts="1" autoCompressPictures="0">
+<p:presentation xmlns:a="http://schemas.openxmlformats.org/drawingml/2006/main" xmlns:r="http://schemas.openxmlformats.org/officeDocument/2006/relationships" xmlns:p="http://schemas.openxmlformats.org/presentationml/2006/main" showSpecialPlsOnTitleSld="0" saveSubsetFonts="1" autoCompressPictures="0">
   <p:sldMasterIdLst>
     <p:sldMasterId id="2147483648" r:id="rId1"/>
   </p:sldMasterIdLst>
+  <p:notesMasterIdLst>
+    <p:notesMasterId r:id="rId17"/>
+  </p:notesMasterIdLst>
   <p:sldIdLst>
     <p:sldId id="256" r:id="rId2"/>
     <p:sldId id="257" r:id="rId3"/>
@@ -18,6 +21,8 @@
     <p:sldId id="261" r:id="rId12"/>
     <p:sldId id="267" r:id="rId13"/>
     <p:sldId id="268" r:id="rId14"/>
+    <p:sldId id="269" r:id="rId15"/>
+    <p:sldId id="270" r:id="rId16"/>
   </p:sldIdLst>
   <p:sldSz cx="12192000" cy="6858000"/>
   <p:notesSz cx="6858000" cy="9144000"/>
@@ -124,6 +129,330 @@
 </p:presentation>
 </file>
 
+<file path=ppt/notesMasters/notesMaster1.xml><?xml version="1.0" encoding="utf-8"?>
+<p:notesMaster xmlns:a="http://schemas.openxmlformats.org/drawingml/2006/main" xmlns:r="http://schemas.openxmlformats.org/officeDocument/2006/relationships" xmlns:p="http://schemas.openxmlformats.org/presentationml/2006/main">
+  <p:cSld>
+    <p:bg>
+      <p:bgRef idx="1001">
+        <a:schemeClr val="bg1"/>
+      </p:bgRef>
+    </p:bg>
+    <p:spTree>
+      <p:nvGrpSpPr>
+        <p:cNvPr id="1" name=""/>
+        <p:cNvGrpSpPr/>
+        <p:nvPr/>
+      </p:nvGrpSpPr>
+      <p:grpSpPr>
+        <a:xfrm>
+          <a:off x="0" y="0"/>
+          <a:ext cx="0" cy="0"/>
+          <a:chOff x="0" y="0"/>
+          <a:chExt cx="0" cy="0"/>
+        </a:xfrm>
+      </p:grpSpPr>
+      <p:sp>
+        <p:nvSpPr>
+          <p:cNvPr id="2" name="Верхний колонтитул 1"/>
+          <p:cNvSpPr>
+            <a:spLocks noGrp="1"/>
+          </p:cNvSpPr>
+          <p:nvPr>
+            <p:ph type="hdr" sz="quarter"/>
+          </p:nvPr>
+        </p:nvSpPr>
+        <p:spPr>
+          <a:xfrm>
+            <a:off x="0" y="0"/>
+            <a:ext cx="2971800" cy="458788"/>
+          </a:xfrm>
+          <a:prstGeom prst="rect">
+            <a:avLst/>
+          </a:prstGeom>
+        </p:spPr>
+        <p:txBody>
+          <a:bodyPr vert="horz" lIns="91440" tIns="45720" rIns="91440" bIns="45720" rtlCol="0"/>
+          <a:lstStyle>
+            <a:lvl1pPr algn="l">
+              <a:defRPr sz="1200"/>
+            </a:lvl1pPr>
+          </a:lstStyle>
+          <a:p>
+            <a:endParaRPr lang="ru-RU"/>
+          </a:p>
+        </p:txBody>
+      </p:sp>
+      <p:sp>
+        <p:nvSpPr>
+          <p:cNvPr id="3" name="Дата 2"/>
+          <p:cNvSpPr>
+            <a:spLocks noGrp="1"/>
+          </p:cNvSpPr>
+          <p:nvPr>
+            <p:ph type="dt" idx="1"/>
+          </p:nvPr>
+        </p:nvSpPr>
+        <p:spPr>
+          <a:xfrm>
+            <a:off x="3884613" y="0"/>
+            <a:ext cx="2971800" cy="458788"/>
+          </a:xfrm>
+          <a:prstGeom prst="rect">
+            <a:avLst/>
+          </a:prstGeom>
+        </p:spPr>
+        <p:txBody>
+          <a:bodyPr vert="horz" lIns="91440" tIns="45720" rIns="91440" bIns="45720" rtlCol="0"/>
+          <a:lstStyle>
+            <a:lvl1pPr algn="r">
+              <a:defRPr sz="1200"/>
+            </a:lvl1pPr>
+          </a:lstStyle>
+          <a:p>
+            <a:fld id="{C1BE233C-821B-974A-A52A-CD29D4926BDE}" type="datetimeFigureOut">
+              <a:rPr lang="ru-RU" smtClean="0"/>
+              <a:t>09.10.2019</a:t>
+            </a:fld>
+            <a:endParaRPr lang="ru-RU"/>
+          </a:p>
+        </p:txBody>
+      </p:sp>
+      <p:sp>
+        <p:nvSpPr>
+          <p:cNvPr id="4" name="Образ слайда 3"/>
+          <p:cNvSpPr>
+            <a:spLocks noGrp="1" noRot="1" noChangeAspect="1"/>
+          </p:cNvSpPr>
+          <p:nvPr>
+            <p:ph type="sldImg" idx="2"/>
+          </p:nvPr>
+        </p:nvSpPr>
+        <p:spPr>
+          <a:xfrm>
+            <a:off x="685800" y="1143000"/>
+            <a:ext cx="5486400" cy="3086100"/>
+          </a:xfrm>
+          <a:prstGeom prst="rect">
+            <a:avLst/>
+          </a:prstGeom>
+          <a:noFill/>
+          <a:ln w="12700">
+            <a:solidFill>
+              <a:prstClr val="black"/>
+            </a:solidFill>
+          </a:ln>
+        </p:spPr>
+        <p:txBody>
+          <a:bodyPr vert="horz" lIns="91440" tIns="45720" rIns="91440" bIns="45720" rtlCol="0" anchor="ctr"/>
+          <a:lstStyle/>
+          <a:p>
+            <a:endParaRPr lang="ru-RU"/>
+          </a:p>
+        </p:txBody>
+      </p:sp>
+      <p:sp>
+        <p:nvSpPr>
+          <p:cNvPr id="5" name="Заметки 4"/>
+          <p:cNvSpPr>
+            <a:spLocks noGrp="1"/>
+          </p:cNvSpPr>
+          <p:nvPr>
+            <p:ph type="body" sz="quarter" idx="3"/>
+          </p:nvPr>
+        </p:nvSpPr>
+        <p:spPr>
+          <a:xfrm>
+            <a:off x="685800" y="4400550"/>
+            <a:ext cx="5486400" cy="3600450"/>
+          </a:xfrm>
+          <a:prstGeom prst="rect">
+            <a:avLst/>
+          </a:prstGeom>
+        </p:spPr>
+        <p:txBody>
+          <a:bodyPr vert="horz" lIns="91440" tIns="45720" rIns="91440" bIns="45720" rtlCol="0"/>
+          <a:lstStyle/>
+          <a:p>
+            <a:r>
+              <a:rPr lang="ru-RU"/>
+              <a:t>Образец текста
+Второй уровень
+Третий уровень
+Четвертый уровень
+Пятый уровень</a:t>
+            </a:r>
+          </a:p>
+        </p:txBody>
+      </p:sp>
+      <p:sp>
+        <p:nvSpPr>
+          <p:cNvPr id="6" name="Нижний колонтитул 5"/>
+          <p:cNvSpPr>
+            <a:spLocks noGrp="1"/>
+          </p:cNvSpPr>
+          <p:nvPr>
+            <p:ph type="ftr" sz="quarter" idx="4"/>
+          </p:nvPr>
+        </p:nvSpPr>
+        <p:spPr>
+          <a:xfrm>
+            <a:off x="0" y="8685213"/>
+            <a:ext cx="2971800" cy="458787"/>
+          </a:xfrm>
+          <a:prstGeom prst="rect">
+            <a:avLst/>
+          </a:prstGeom>
+        </p:spPr>
+        <p:txBody>
+          <a:bodyPr vert="horz" lIns="91440" tIns="45720" rIns="91440" bIns="45720" rtlCol="0" anchor="b"/>
+          <a:lstStyle>
+            <a:lvl1pPr algn="l">
+              <a:defRPr sz="1200"/>
+            </a:lvl1pPr>
+          </a:lstStyle>
+          <a:p>
+            <a:endParaRPr lang="ru-RU"/>
+          </a:p>
+        </p:txBody>
+      </p:sp>
+      <p:sp>
+        <p:nvSpPr>
+          <p:cNvPr id="7" name="Номер слайда 6"/>
+          <p:cNvSpPr>
+            <a:spLocks noGrp="1"/>
+          </p:cNvSpPr>
+          <p:nvPr>
+            <p:ph type="sldNum" sz="quarter" idx="5"/>
+          </p:nvPr>
+        </p:nvSpPr>
+        <p:spPr>
+          <a:xfrm>
+            <a:off x="3884613" y="8685213"/>
+            <a:ext cx="2971800" cy="458787"/>
+          </a:xfrm>
+          <a:prstGeom prst="rect">
+            <a:avLst/>
+          </a:prstGeom>
+        </p:spPr>
+        <p:txBody>
+          <a:bodyPr vert="horz" lIns="91440" tIns="45720" rIns="91440" bIns="45720" rtlCol="0" anchor="b"/>
+          <a:lstStyle>
+            <a:lvl1pPr algn="r">
+              <a:defRPr sz="1200"/>
+            </a:lvl1pPr>
+          </a:lstStyle>
+          <a:p>
+            <a:fld id="{B574328E-4A40-AC4B-8297-76EDF4845CD1}" type="slidenum">
+              <a:rPr lang="ru-RU" smtClean="0"/>
+              <a:t>‹#›</a:t>
+            </a:fld>
+            <a:endParaRPr lang="ru-RU"/>
+          </a:p>
+        </p:txBody>
+      </p:sp>
+    </p:spTree>
+    <p:extLst>
+      <p:ext uri="{BB962C8B-B14F-4D97-AF65-F5344CB8AC3E}">
+        <p14:creationId xmlns:p14="http://schemas.microsoft.com/office/powerpoint/2010/main" val="1340382817"/>
+      </p:ext>
+    </p:extLst>
+  </p:cSld>
+  <p:clrMap bg1="lt1" tx1="dk1" bg2="lt2" tx2="dk2" accent1="accent1" accent2="accent2" accent3="accent3" accent4="accent4" accent5="accent5" accent6="accent6" hlink="hlink" folHlink="folHlink"/>
+  <p:notesStyle>
+    <a:lvl1pPr marL="0" algn="l" defTabSz="914400" rtl="0" eaLnBrk="1" latinLnBrk="0" hangingPunct="1">
+      <a:defRPr sz="1200" kern="1200">
+        <a:solidFill>
+          <a:schemeClr val="tx1"/>
+        </a:solidFill>
+        <a:latin typeface="+mn-lt"/>
+        <a:ea typeface="+mn-ea"/>
+        <a:cs typeface="+mn-cs"/>
+      </a:defRPr>
+    </a:lvl1pPr>
+    <a:lvl2pPr marL="457200" algn="l" defTabSz="914400" rtl="0" eaLnBrk="1" latinLnBrk="0" hangingPunct="1">
+      <a:defRPr sz="1200" kern="1200">
+        <a:solidFill>
+          <a:schemeClr val="tx1"/>
+        </a:solidFill>
+        <a:latin typeface="+mn-lt"/>
+        <a:ea typeface="+mn-ea"/>
+        <a:cs typeface="+mn-cs"/>
+      </a:defRPr>
+    </a:lvl2pPr>
+    <a:lvl3pPr marL="914400" algn="l" defTabSz="914400" rtl="0" eaLnBrk="1" latinLnBrk="0" hangingPunct="1">
+      <a:defRPr sz="1200" kern="1200">
+        <a:solidFill>
+          <a:schemeClr val="tx1"/>
+        </a:solidFill>
+        <a:latin typeface="+mn-lt"/>
+        <a:ea typeface="+mn-ea"/>
+        <a:cs typeface="+mn-cs"/>
+      </a:defRPr>
+    </a:lvl3pPr>
+    <a:lvl4pPr marL="1371600" algn="l" defTabSz="914400" rtl="0" eaLnBrk="1" latinLnBrk="0" hangingPunct="1">
+      <a:defRPr sz="1200" kern="1200">
+        <a:solidFill>
+          <a:schemeClr val="tx1"/>
+        </a:solidFill>
+        <a:latin typeface="+mn-lt"/>
+        <a:ea typeface="+mn-ea"/>
+        <a:cs typeface="+mn-cs"/>
+      </a:defRPr>
+    </a:lvl4pPr>
+    <a:lvl5pPr marL="1828800" algn="l" defTabSz="914400" rtl="0" eaLnBrk="1" latinLnBrk="0" hangingPunct="1">
+      <a:defRPr sz="1200" kern="1200">
+        <a:solidFill>
+          <a:schemeClr val="tx1"/>
+        </a:solidFill>
+        <a:latin typeface="+mn-lt"/>
+        <a:ea typeface="+mn-ea"/>
+        <a:cs typeface="+mn-cs"/>
+      </a:defRPr>
+    </a:lvl5pPr>
+    <a:lvl6pPr marL="2286000" algn="l" defTabSz="914400" rtl="0" eaLnBrk="1" latinLnBrk="0" hangingPunct="1">
+      <a:defRPr sz="1200" kern="1200">
+        <a:solidFill>
+          <a:schemeClr val="tx1"/>
+        </a:solidFill>
+        <a:latin typeface="+mn-lt"/>
+        <a:ea typeface="+mn-ea"/>
+        <a:cs typeface="+mn-cs"/>
+      </a:defRPr>
+    </a:lvl6pPr>
+    <a:lvl7pPr marL="2743200" algn="l" defTabSz="914400" rtl="0" eaLnBrk="1" latinLnBrk="0" hangingPunct="1">
+      <a:defRPr sz="1200" kern="1200">
+        <a:solidFill>
+          <a:schemeClr val="tx1"/>
+        </a:solidFill>
+        <a:latin typeface="+mn-lt"/>
+        <a:ea typeface="+mn-ea"/>
+        <a:cs typeface="+mn-cs"/>
+      </a:defRPr>
+    </a:lvl7pPr>
+    <a:lvl8pPr marL="3200400" algn="l" defTabSz="914400" rtl="0" eaLnBrk="1" latinLnBrk="0" hangingPunct="1">
+      <a:defRPr sz="1200" kern="1200">
+        <a:solidFill>
+          <a:schemeClr val="tx1"/>
+        </a:solidFill>
+        <a:latin typeface="+mn-lt"/>
+        <a:ea typeface="+mn-ea"/>
+        <a:cs typeface="+mn-cs"/>
+      </a:defRPr>
+    </a:lvl8pPr>
+    <a:lvl9pPr marL="3657600" algn="l" defTabSz="914400" rtl="0" eaLnBrk="1" latinLnBrk="0" hangingPunct="1">
+      <a:defRPr sz="1200" kern="1200">
+        <a:solidFill>
+          <a:schemeClr val="tx1"/>
+        </a:solidFill>
+        <a:latin typeface="+mn-lt"/>
+        <a:ea typeface="+mn-ea"/>
+        <a:cs typeface="+mn-cs"/>
+      </a:defRPr>
+    </a:lvl9pPr>
+  </p:notesStyle>
+</p:notesMaster>
+</file>
+
 <file path=ppt/slideLayouts/slideLayout1.xml><?xml version="1.0" encoding="utf-8"?>
 <p:sldLayout xmlns:a="http://schemas.openxmlformats.org/drawingml/2006/main" xmlns:r="http://schemas.openxmlformats.org/officeDocument/2006/relationships" xmlns:p="http://schemas.openxmlformats.org/presentationml/2006/main" type="title" preserve="1">
   <p:cSld name="Титульный слайд">
@@ -269,9 +598,9 @@
           <a:bodyPr/>
           <a:lstStyle/>
           <a:p>
-            <a:fld id="{ACC5648C-C872-5249-A293-E050A464200A}" type="datetimeFigureOut">
+            <a:fld id="{2E132DE3-3A85-534B-9651-69C158026FC5}" type="datetime1">
               <a:rPr lang="ru-RU" smtClean="0"/>
-              <a:t>08.10.2019</a:t>
+              <a:t>09.10.2019</a:t>
             </a:fld>
             <a:endParaRPr lang="ru-RU"/>
           </a:p>
@@ -442,9 +771,9 @@
           <a:bodyPr/>
           <a:lstStyle/>
           <a:p>
-            <a:fld id="{ACC5648C-C872-5249-A293-E050A464200A}" type="datetimeFigureOut">
+            <a:fld id="{E98D4417-AD14-C849-8B7E-6A6980018476}" type="datetime1">
               <a:rPr lang="ru-RU" smtClean="0"/>
-              <a:t>08.10.2019</a:t>
+              <a:t>09.10.2019</a:t>
             </a:fld>
             <a:endParaRPr lang="ru-RU"/>
           </a:p>
@@ -625,9 +954,9 @@
           <a:bodyPr/>
           <a:lstStyle/>
           <a:p>
-            <a:fld id="{ACC5648C-C872-5249-A293-E050A464200A}" type="datetimeFigureOut">
+            <a:fld id="{BFE9C9B0-2AEE-9F4C-BB3E-9B30570F0C19}" type="datetime1">
               <a:rPr lang="ru-RU" smtClean="0"/>
-              <a:t>08.10.2019</a:t>
+              <a:t>09.10.2019</a:t>
             </a:fld>
             <a:endParaRPr lang="ru-RU"/>
           </a:p>
@@ -798,9 +1127,9 @@
           <a:bodyPr/>
           <a:lstStyle/>
           <a:p>
-            <a:fld id="{ACC5648C-C872-5249-A293-E050A464200A}" type="datetimeFigureOut">
+            <a:fld id="{90A65726-7F6C-4041-868B-244862CB30F1}" type="datetime1">
               <a:rPr lang="ru-RU" smtClean="0"/>
-              <a:t>08.10.2019</a:t>
+              <a:t>09.10.2019</a:t>
             </a:fld>
             <a:endParaRPr lang="ru-RU"/>
           </a:p>
@@ -1076,9 +1405,9 @@
           <a:bodyPr/>
           <a:lstStyle/>
           <a:p>
-            <a:fld id="{ACC5648C-C872-5249-A293-E050A464200A}" type="datetimeFigureOut">
+            <a:fld id="{1184FBBA-8785-DC4A-A93C-FC4CD6ADE36B}" type="datetime1">
               <a:rPr lang="ru-RU" smtClean="0"/>
-              <a:t>08.10.2019</a:t>
+              <a:t>09.10.2019</a:t>
             </a:fld>
             <a:endParaRPr lang="ru-RU"/>
           </a:p>
@@ -1291,9 +1620,9 @@
           <a:bodyPr/>
           <a:lstStyle/>
           <a:p>
-            <a:fld id="{ACC5648C-C872-5249-A293-E050A464200A}" type="datetimeFigureOut">
+            <a:fld id="{835EE99D-4BDE-194F-BC3E-9B7D3C76FEFA}" type="datetime1">
               <a:rPr lang="ru-RU" smtClean="0"/>
-              <a:t>08.10.2019</a:t>
+              <a:t>09.10.2019</a:t>
             </a:fld>
             <a:endParaRPr lang="ru-RU"/>
           </a:p>
@@ -1659,9 +1988,9 @@
           <a:bodyPr/>
           <a:lstStyle/>
           <a:p>
-            <a:fld id="{ACC5648C-C872-5249-A293-E050A464200A}" type="datetimeFigureOut">
+            <a:fld id="{5EFCAC52-90F7-1E4D-9FD8-37A22881766A}" type="datetime1">
               <a:rPr lang="ru-RU" smtClean="0"/>
-              <a:t>08.10.2019</a:t>
+              <a:t>09.10.2019</a:t>
             </a:fld>
             <a:endParaRPr lang="ru-RU"/>
           </a:p>
@@ -1800,9 +2129,9 @@
           <a:bodyPr/>
           <a:lstStyle/>
           <a:p>
-            <a:fld id="{ACC5648C-C872-5249-A293-E050A464200A}" type="datetimeFigureOut">
+            <a:fld id="{6E5BBC5D-D354-1A48-A947-FD53F892AC62}" type="datetime1">
               <a:rPr lang="ru-RU" smtClean="0"/>
-              <a:t>08.10.2019</a:t>
+              <a:t>09.10.2019</a:t>
             </a:fld>
             <a:endParaRPr lang="ru-RU"/>
           </a:p>
@@ -1913,9 +2242,9 @@
           <a:bodyPr/>
           <a:lstStyle/>
           <a:p>
-            <a:fld id="{ACC5648C-C872-5249-A293-E050A464200A}" type="datetimeFigureOut">
+            <a:fld id="{55845D2C-3AD4-454E-890D-8819E7F9CC89}" type="datetime1">
               <a:rPr lang="ru-RU" smtClean="0"/>
-              <a:t>08.10.2019</a:t>
+              <a:t>09.10.2019</a:t>
             </a:fld>
             <a:endParaRPr lang="ru-RU"/>
           </a:p>
@@ -2202,9 +2531,9 @@
           <a:bodyPr/>
           <a:lstStyle/>
           <a:p>
-            <a:fld id="{ACC5648C-C872-5249-A293-E050A464200A}" type="datetimeFigureOut">
+            <a:fld id="{32AD0C68-1C81-6148-BA97-FE9643273DE0}" type="datetime1">
               <a:rPr lang="ru-RU" smtClean="0"/>
-              <a:t>08.10.2019</a:t>
+              <a:t>09.10.2019</a:t>
             </a:fld>
             <a:endParaRPr lang="ru-RU"/>
           </a:p>
@@ -2493,9 +2822,9 @@
           <a:bodyPr/>
           <a:lstStyle/>
           <a:p>
-            <a:fld id="{ACC5648C-C872-5249-A293-E050A464200A}" type="datetimeFigureOut">
+            <a:fld id="{ED5B4937-9B2A-3B49-A229-92C09A155F1F}" type="datetime1">
               <a:rPr lang="ru-RU" smtClean="0"/>
-              <a:t>08.10.2019</a:t>
+              <a:t>09.10.2019</a:t>
             </a:fld>
             <a:endParaRPr lang="ru-RU"/>
           </a:p>
@@ -2709,9 +3038,9 @@
             </a:lvl1pPr>
           </a:lstStyle>
           <a:p>
-            <a:fld id="{ACC5648C-C872-5249-A293-E050A464200A}" type="datetimeFigureOut">
+            <a:fld id="{D1A570F3-012D-6640-87D8-43D8365EB611}" type="datetime1">
               <a:rPr lang="ru-RU" smtClean="0"/>
-              <a:t>08.10.2019</a:t>
+              <a:t>09.10.2019</a:t>
             </a:fld>
             <a:endParaRPr lang="ru-RU"/>
           </a:p>
@@ -2828,6 +3157,7 @@
     <p:sldLayoutId id="2147483658" r:id="rId10"/>
     <p:sldLayoutId id="2147483659" r:id="rId11"/>
   </p:sldLayoutIdLst>
+  <p:hf hdr="0" ftr="0" dt="0"/>
   <p:txStyles>
     <p:titleStyle>
       <a:lvl1pPr algn="l" defTabSz="914400" rtl="0" eaLnBrk="1" latinLnBrk="0" hangingPunct="1">
@@ -4444,6 +4774,35 @@
           </a:p>
         </p:txBody>
       </p:sp>
+      <p:sp>
+        <p:nvSpPr>
+          <p:cNvPr id="7" name="Номер слайда 6">
+            <a:extLst>
+              <a:ext uri="{FF2B5EF4-FFF2-40B4-BE49-F238E27FC236}">
+                <a16:creationId xmlns:a16="http://schemas.microsoft.com/office/drawing/2014/main" id="{80C157FC-CA4B-854B-9AC2-0A7DC6A35E2C}"/>
+              </a:ext>
+            </a:extLst>
+          </p:cNvPr>
+          <p:cNvSpPr>
+            <a:spLocks noGrp="1"/>
+          </p:cNvSpPr>
+          <p:nvPr>
+            <p:ph type="sldNum" sz="quarter" idx="12"/>
+          </p:nvPr>
+        </p:nvSpPr>
+        <p:spPr/>
+        <p:txBody>
+          <a:bodyPr/>
+          <a:lstStyle/>
+          <a:p>
+            <a:fld id="{BCF1BF90-A525-E342-BC2E-E63C1FF229A5}" type="slidenum">
+              <a:rPr lang="ru-RU" smtClean="0"/>
+              <a:t>10</a:t>
+            </a:fld>
+            <a:endParaRPr lang="ru-RU"/>
+          </a:p>
+        </p:txBody>
+      </p:sp>
     </p:spTree>
     <p:extLst>
       <p:ext uri="{BB962C8B-B14F-4D97-AF65-F5344CB8AC3E}">
@@ -5324,6 +5683,35 @@
           </a:p>
         </p:txBody>
       </p:sp>
+      <p:sp>
+        <p:nvSpPr>
+          <p:cNvPr id="3" name="Номер слайда 2">
+            <a:extLst>
+              <a:ext uri="{FF2B5EF4-FFF2-40B4-BE49-F238E27FC236}">
+                <a16:creationId xmlns:a16="http://schemas.microsoft.com/office/drawing/2014/main" id="{C0414784-0BA0-CC45-9D7F-0DAD02605D6A}"/>
+              </a:ext>
+            </a:extLst>
+          </p:cNvPr>
+          <p:cNvSpPr>
+            <a:spLocks noGrp="1"/>
+          </p:cNvSpPr>
+          <p:nvPr>
+            <p:ph type="sldNum" sz="quarter" idx="12"/>
+          </p:nvPr>
+        </p:nvSpPr>
+        <p:spPr/>
+        <p:txBody>
+          <a:bodyPr/>
+          <a:lstStyle/>
+          <a:p>
+            <a:fld id="{BCF1BF90-A525-E342-BC2E-E63C1FF229A5}" type="slidenum">
+              <a:rPr lang="ru-RU" smtClean="0"/>
+              <a:t>11</a:t>
+            </a:fld>
+            <a:endParaRPr lang="ru-RU"/>
+          </a:p>
+        </p:txBody>
+      </p:sp>
     </p:spTree>
     <p:extLst>
       <p:ext uri="{BB962C8B-B14F-4D97-AF65-F5344CB8AC3E}">
@@ -5456,6 +5844,35 @@
           </a:prstGeom>
         </p:spPr>
       </p:pic>
+      <p:sp>
+        <p:nvSpPr>
+          <p:cNvPr id="9" name="Номер слайда 8">
+            <a:extLst>
+              <a:ext uri="{FF2B5EF4-FFF2-40B4-BE49-F238E27FC236}">
+                <a16:creationId xmlns:a16="http://schemas.microsoft.com/office/drawing/2014/main" id="{C61DB79B-7CB2-0449-9C00-BFA666BB49D4}"/>
+              </a:ext>
+            </a:extLst>
+          </p:cNvPr>
+          <p:cNvSpPr>
+            <a:spLocks noGrp="1"/>
+          </p:cNvSpPr>
+          <p:nvPr>
+            <p:ph type="sldNum" sz="quarter" idx="12"/>
+          </p:nvPr>
+        </p:nvSpPr>
+        <p:spPr/>
+        <p:txBody>
+          <a:bodyPr/>
+          <a:lstStyle/>
+          <a:p>
+            <a:fld id="{BCF1BF90-A525-E342-BC2E-E63C1FF229A5}" type="slidenum">
+              <a:rPr lang="ru-RU" smtClean="0"/>
+              <a:t>12</a:t>
+            </a:fld>
+            <a:endParaRPr lang="ru-RU"/>
+          </a:p>
+        </p:txBody>
+      </p:sp>
     </p:spTree>
     <p:extLst>
       <p:ext uri="{BB962C8B-B14F-4D97-AF65-F5344CB8AC3E}">
@@ -5509,40 +5926,21 @@
           </a:xfrm>
         </p:spPr>
         <p:txBody>
-          <a:bodyPr/>
+          <a:bodyPr>
+            <a:normAutofit/>
+          </a:bodyPr>
           <a:lstStyle/>
           <a:p>
-            <a:endParaRPr lang="ru-RU" dirty="0"/>
-          </a:p>
-        </p:txBody>
-      </p:sp>
-      <p:sp>
-        <p:nvSpPr>
-          <p:cNvPr id="3" name="Объект 2">
-            <a:extLst>
-              <a:ext uri="{FF2B5EF4-FFF2-40B4-BE49-F238E27FC236}">
-                <a16:creationId xmlns:a16="http://schemas.microsoft.com/office/drawing/2014/main" id="{EB7EE44E-9BF8-2140-AEC2-B030BC63C3C4}"/>
-              </a:ext>
-            </a:extLst>
-          </p:cNvPr>
-          <p:cNvSpPr>
-            <a:spLocks noGrp="1"/>
-          </p:cNvSpPr>
-          <p:nvPr>
-            <p:ph idx="1"/>
-          </p:nvPr>
-        </p:nvSpPr>
-        <p:spPr>
-          <a:xfrm>
-            <a:off x="2115398" y="1825625"/>
-            <a:ext cx="9238402" cy="4351338"/>
-          </a:xfrm>
-        </p:spPr>
-        <p:txBody>
-          <a:bodyPr/>
-          <a:lstStyle/>
-          <a:p>
-            <a:endParaRPr lang="ru-RU" dirty="0"/>
+            <a:pPr algn="ctr"/>
+            <a:r>
+              <a:rPr lang="ru-RU" sz="3600" b="1" dirty="0"/>
+              <a:t>Выход продуктов реакции деления из-под оболочки </a:t>
+            </a:r>
+            <a:r>
+              <a:rPr lang="ru-RU" sz="3600" b="1" dirty="0" err="1"/>
+              <a:t>ТВЭЛов</a:t>
+            </a:r>
+            <a:endParaRPr lang="ru-RU" sz="3600" dirty="0"/>
           </a:p>
         </p:txBody>
       </p:sp>
@@ -5582,10 +5980,762 @@
           </a:prstGeom>
         </p:spPr>
       </p:pic>
+      <p:pic>
+        <p:nvPicPr>
+          <p:cNvPr id="7" name="Рисунок 6">
+            <a:extLst>
+              <a:ext uri="{FF2B5EF4-FFF2-40B4-BE49-F238E27FC236}">
+                <a16:creationId xmlns:a16="http://schemas.microsoft.com/office/drawing/2014/main" id="{A3935E1E-FEBC-1D4A-BD72-63248D0ABB64}"/>
+              </a:ext>
+            </a:extLst>
+          </p:cNvPr>
+          <p:cNvPicPr>
+            <a:picLocks noChangeAspect="1"/>
+          </p:cNvPicPr>
+          <p:nvPr/>
+        </p:nvPicPr>
+        <p:blipFill>
+          <a:blip r:embed="rId3"/>
+          <a:stretch>
+            <a:fillRect/>
+          </a:stretch>
+        </p:blipFill>
+        <p:spPr>
+          <a:xfrm>
+            <a:off x="4115591" y="2629508"/>
+            <a:ext cx="5238009" cy="1244027"/>
+          </a:xfrm>
+          <a:prstGeom prst="rect">
+            <a:avLst/>
+          </a:prstGeom>
+        </p:spPr>
+      </p:pic>
+      <p:sp>
+        <p:nvSpPr>
+          <p:cNvPr id="10" name="TextBox 9">
+            <a:extLst>
+              <a:ext uri="{FF2B5EF4-FFF2-40B4-BE49-F238E27FC236}">
+                <a16:creationId xmlns:a16="http://schemas.microsoft.com/office/drawing/2014/main" id="{B23A6249-473C-6147-A7B7-EAD7F6D06DE0}"/>
+              </a:ext>
+            </a:extLst>
+          </p:cNvPr>
+          <p:cNvSpPr txBox="1"/>
+          <p:nvPr/>
+        </p:nvSpPr>
+        <p:spPr>
+          <a:xfrm>
+            <a:off x="2881108" y="1951413"/>
+            <a:ext cx="7706982" cy="646331"/>
+          </a:xfrm>
+          <a:prstGeom prst="rect">
+            <a:avLst/>
+          </a:prstGeom>
+          <a:noFill/>
+        </p:spPr>
+        <p:txBody>
+          <a:bodyPr wrap="none" rtlCol="0">
+            <a:spAutoFit/>
+          </a:bodyPr>
+          <a:lstStyle/>
+          <a:p>
+            <a:pPr algn="ctr"/>
+            <a:r>
+              <a:rPr lang="ru-RU" dirty="0"/>
+              <a:t>Изменение концентрации </a:t>
+            </a:r>
+            <a:r>
+              <a:rPr lang="en-US" dirty="0" err="1"/>
+              <a:t>i</a:t>
+            </a:r>
+            <a:r>
+              <a:rPr lang="en-US" dirty="0"/>
+              <a:t>-</a:t>
+            </a:r>
+            <a:r>
+              <a:rPr lang="ru-RU" dirty="0"/>
+              <a:t>ого радионуклида</a:t>
+            </a:r>
+            <a:r>
+              <a:rPr lang="en-US" dirty="0"/>
+              <a:t>, </a:t>
+            </a:r>
+            <a:r>
+              <a:rPr lang="ru-RU" dirty="0"/>
+              <a:t>образующегося в результате </a:t>
+            </a:r>
+          </a:p>
+          <a:p>
+            <a:pPr algn="ctr"/>
+            <a:r>
+              <a:rPr lang="ru-RU" dirty="0"/>
+              <a:t>деления ядер топлива под оболочкой </a:t>
+            </a:r>
+            <a:r>
+              <a:rPr lang="ru-RU" dirty="0" err="1"/>
+              <a:t>ТВЭЛа</a:t>
+            </a:r>
+            <a:endParaRPr lang="ru-RU" dirty="0"/>
+          </a:p>
+        </p:txBody>
+      </p:sp>
+      <p:pic>
+        <p:nvPicPr>
+          <p:cNvPr id="12" name="Рисунок 11">
+            <a:extLst>
+              <a:ext uri="{FF2B5EF4-FFF2-40B4-BE49-F238E27FC236}">
+                <a16:creationId xmlns:a16="http://schemas.microsoft.com/office/drawing/2014/main" id="{93B146D5-8369-8F41-81C9-76496E69F176}"/>
+              </a:ext>
+            </a:extLst>
+          </p:cNvPr>
+          <p:cNvPicPr>
+            <a:picLocks noChangeAspect="1"/>
+          </p:cNvPicPr>
+          <p:nvPr/>
+        </p:nvPicPr>
+        <p:blipFill>
+          <a:blip r:embed="rId4"/>
+          <a:stretch>
+            <a:fillRect/>
+          </a:stretch>
+        </p:blipFill>
+        <p:spPr>
+          <a:xfrm>
+            <a:off x="5017030" y="4756258"/>
+            <a:ext cx="3435133" cy="1241410"/>
+          </a:xfrm>
+          <a:prstGeom prst="rect">
+            <a:avLst/>
+          </a:prstGeom>
+        </p:spPr>
+      </p:pic>
+      <p:sp>
+        <p:nvSpPr>
+          <p:cNvPr id="14" name="TextBox 13">
+            <a:extLst>
+              <a:ext uri="{FF2B5EF4-FFF2-40B4-BE49-F238E27FC236}">
+                <a16:creationId xmlns:a16="http://schemas.microsoft.com/office/drawing/2014/main" id="{9AADBE65-C0AA-FA4C-98CD-68B382F5A000}"/>
+              </a:ext>
+            </a:extLst>
+          </p:cNvPr>
+          <p:cNvSpPr txBox="1"/>
+          <p:nvPr/>
+        </p:nvSpPr>
+        <p:spPr>
+          <a:xfrm>
+            <a:off x="2690512" y="3991731"/>
+            <a:ext cx="8088175" cy="646331"/>
+          </a:xfrm>
+          <a:prstGeom prst="rect">
+            <a:avLst/>
+          </a:prstGeom>
+          <a:noFill/>
+        </p:spPr>
+        <p:txBody>
+          <a:bodyPr wrap="none" rtlCol="0">
+            <a:spAutoFit/>
+          </a:bodyPr>
+          <a:lstStyle/>
+          <a:p>
+            <a:pPr algn="ctr"/>
+            <a:r>
+              <a:rPr lang="ru-RU" dirty="0"/>
+              <a:t>Изменение концентрации </a:t>
+            </a:r>
+            <a:r>
+              <a:rPr lang="en-US" dirty="0" err="1"/>
+              <a:t>i</a:t>
+            </a:r>
+            <a:r>
+              <a:rPr lang="en-US" dirty="0"/>
+              <a:t>-</a:t>
+            </a:r>
+            <a:r>
+              <a:rPr lang="ru-RU" dirty="0"/>
+              <a:t>ого радионуклида</a:t>
+            </a:r>
+            <a:r>
+              <a:rPr lang="en-US" dirty="0"/>
+              <a:t> </a:t>
+            </a:r>
+            <a:r>
+              <a:rPr lang="ru-RU" dirty="0"/>
+              <a:t>в теплоносителе первого контура</a:t>
+            </a:r>
+          </a:p>
+          <a:p>
+            <a:pPr algn="ctr"/>
+            <a:r>
+              <a:rPr lang="ru-RU" dirty="0"/>
+              <a:t>реакторной установки</a:t>
+            </a:r>
+          </a:p>
+        </p:txBody>
+      </p:sp>
+      <p:sp>
+        <p:nvSpPr>
+          <p:cNvPr id="17" name="Номер слайда 16">
+            <a:extLst>
+              <a:ext uri="{FF2B5EF4-FFF2-40B4-BE49-F238E27FC236}">
+                <a16:creationId xmlns:a16="http://schemas.microsoft.com/office/drawing/2014/main" id="{6A22D969-7B2F-EA41-811C-9FC6014D78D3}"/>
+              </a:ext>
+            </a:extLst>
+          </p:cNvPr>
+          <p:cNvSpPr>
+            <a:spLocks noGrp="1"/>
+          </p:cNvSpPr>
+          <p:nvPr>
+            <p:ph type="sldNum" sz="quarter" idx="12"/>
+          </p:nvPr>
+        </p:nvSpPr>
+        <p:spPr/>
+        <p:txBody>
+          <a:bodyPr/>
+          <a:lstStyle/>
+          <a:p>
+            <a:fld id="{BCF1BF90-A525-E342-BC2E-E63C1FF229A5}" type="slidenum">
+              <a:rPr lang="ru-RU" smtClean="0"/>
+              <a:t>13</a:t>
+            </a:fld>
+            <a:endParaRPr lang="ru-RU"/>
+          </a:p>
+        </p:txBody>
+      </p:sp>
     </p:spTree>
     <p:extLst>
       <p:ext uri="{BB962C8B-B14F-4D97-AF65-F5344CB8AC3E}">
         <p14:creationId xmlns:p14="http://schemas.microsoft.com/office/powerpoint/2010/main" val="298540108"/>
+      </p:ext>
+    </p:extLst>
+  </p:cSld>
+  <p:clrMapOvr>
+    <a:masterClrMapping/>
+  </p:clrMapOvr>
+</p:sld>
+</file>
+
+<file path=ppt/slides/slide14.xml><?xml version="1.0" encoding="utf-8"?>
+<p:sld xmlns:a="http://schemas.openxmlformats.org/drawingml/2006/main" xmlns:r="http://schemas.openxmlformats.org/officeDocument/2006/relationships" xmlns:p="http://schemas.openxmlformats.org/presentationml/2006/main">
+  <p:cSld>
+    <p:spTree>
+      <p:nvGrpSpPr>
+        <p:cNvPr id="1" name=""/>
+        <p:cNvGrpSpPr/>
+        <p:nvPr/>
+      </p:nvGrpSpPr>
+      <p:grpSpPr>
+        <a:xfrm>
+          <a:off x="0" y="0"/>
+          <a:ext cx="0" cy="0"/>
+          <a:chOff x="0" y="0"/>
+          <a:chExt cx="0" cy="0"/>
+        </a:xfrm>
+      </p:grpSpPr>
+      <p:sp>
+        <p:nvSpPr>
+          <p:cNvPr id="2" name="Заголовок 1">
+            <a:extLst>
+              <a:ext uri="{FF2B5EF4-FFF2-40B4-BE49-F238E27FC236}">
+                <a16:creationId xmlns:a16="http://schemas.microsoft.com/office/drawing/2014/main" id="{F42FB40B-4D44-A148-BD31-7C7CAB944763}"/>
+              </a:ext>
+            </a:extLst>
+          </p:cNvPr>
+          <p:cNvSpPr>
+            <a:spLocks noGrp="1"/>
+          </p:cNvSpPr>
+          <p:nvPr>
+            <p:ph type="title"/>
+          </p:nvPr>
+        </p:nvSpPr>
+        <p:spPr>
+          <a:xfrm>
+            <a:off x="2115398" y="365125"/>
+            <a:ext cx="9238401" cy="1325563"/>
+          </a:xfrm>
+        </p:spPr>
+        <p:txBody>
+          <a:bodyPr>
+            <a:normAutofit/>
+          </a:bodyPr>
+          <a:lstStyle/>
+          <a:p>
+            <a:pPr algn="ctr"/>
+            <a:r>
+              <a:rPr lang="ru-RU" sz="3600" b="1" dirty="0"/>
+              <a:t>Выход продуктов реакции деления из-под оболочки </a:t>
+            </a:r>
+            <a:r>
+              <a:rPr lang="ru-RU" sz="3600" b="1" dirty="0" err="1"/>
+              <a:t>ТВЭЛов</a:t>
+            </a:r>
+            <a:endParaRPr lang="ru-RU" sz="3600" dirty="0"/>
+          </a:p>
+        </p:txBody>
+      </p:sp>
+      <p:pic>
+        <p:nvPicPr>
+          <p:cNvPr id="4" name="Рисунок 3">
+            <a:extLst>
+              <a:ext uri="{FF2B5EF4-FFF2-40B4-BE49-F238E27FC236}">
+                <a16:creationId xmlns:a16="http://schemas.microsoft.com/office/drawing/2014/main" id="{F6F223FE-0D74-ED42-9B38-CDC2F5E44EE9}"/>
+              </a:ext>
+            </a:extLst>
+          </p:cNvPr>
+          <p:cNvPicPr>
+            <a:picLocks noChangeAspect="1"/>
+          </p:cNvPicPr>
+          <p:nvPr/>
+        </p:nvPicPr>
+        <p:blipFill>
+          <a:blip r:embed="rId2" cstate="print">
+            <a:extLst>
+              <a:ext uri="{28A0092B-C50C-407E-A947-70E740481C1C}">
+                <a14:useLocalDpi xmlns:a14="http://schemas.microsoft.com/office/drawing/2010/main" val="0"/>
+              </a:ext>
+            </a:extLst>
+          </a:blip>
+          <a:stretch>
+            <a:fillRect/>
+          </a:stretch>
+        </p:blipFill>
+        <p:spPr>
+          <a:xfrm>
+            <a:off x="54000" y="104400"/>
+            <a:ext cx="2061399" cy="2023150"/>
+          </a:xfrm>
+          <a:prstGeom prst="rect">
+            <a:avLst/>
+          </a:prstGeom>
+        </p:spPr>
+      </p:pic>
+      <p:pic>
+        <p:nvPicPr>
+          <p:cNvPr id="7" name="Рисунок 6">
+            <a:extLst>
+              <a:ext uri="{FF2B5EF4-FFF2-40B4-BE49-F238E27FC236}">
+                <a16:creationId xmlns:a16="http://schemas.microsoft.com/office/drawing/2014/main" id="{CE244FE5-534A-8241-829D-C70BE3C0518E}"/>
+              </a:ext>
+            </a:extLst>
+          </p:cNvPr>
+          <p:cNvPicPr>
+            <a:picLocks noChangeAspect="1"/>
+          </p:cNvPicPr>
+          <p:nvPr/>
+        </p:nvPicPr>
+        <p:blipFill>
+          <a:blip r:embed="rId3"/>
+          <a:stretch>
+            <a:fillRect/>
+          </a:stretch>
+        </p:blipFill>
+        <p:spPr>
+          <a:xfrm>
+            <a:off x="5662524" y="2657697"/>
+            <a:ext cx="2144148" cy="1262508"/>
+          </a:xfrm>
+          <a:prstGeom prst="rect">
+            <a:avLst/>
+          </a:prstGeom>
+        </p:spPr>
+      </p:pic>
+      <p:sp>
+        <p:nvSpPr>
+          <p:cNvPr id="8" name="Прямоугольник 7">
+            <a:extLst>
+              <a:ext uri="{FF2B5EF4-FFF2-40B4-BE49-F238E27FC236}">
+                <a16:creationId xmlns:a16="http://schemas.microsoft.com/office/drawing/2014/main" id="{3858546E-F7E8-FC4E-80BE-D73616E5DC3D}"/>
+              </a:ext>
+            </a:extLst>
+          </p:cNvPr>
+          <p:cNvSpPr/>
+          <p:nvPr/>
+        </p:nvSpPr>
+        <p:spPr>
+          <a:xfrm>
+            <a:off x="3089644" y="1936591"/>
+            <a:ext cx="7289910" cy="646331"/>
+          </a:xfrm>
+          <a:prstGeom prst="rect">
+            <a:avLst/>
+          </a:prstGeom>
+        </p:spPr>
+        <p:txBody>
+          <a:bodyPr wrap="square">
+            <a:spAutoFit/>
+          </a:bodyPr>
+          <a:lstStyle/>
+          <a:p>
+            <a:pPr algn="ctr"/>
+            <a:r>
+              <a:rPr lang="ru-RU" dirty="0"/>
+              <a:t>Баланс между концентрацией </a:t>
+            </a:r>
+            <a:r>
+              <a:rPr lang="en-US" dirty="0" err="1"/>
+              <a:t>i</a:t>
+            </a:r>
+            <a:r>
+              <a:rPr lang="en-US" dirty="0"/>
+              <a:t>-</a:t>
+            </a:r>
+            <a:r>
+              <a:rPr lang="ru-RU" dirty="0"/>
+              <a:t>ого радионуклида в теплоносителе первого контура и его выходом из-под оболочки </a:t>
+            </a:r>
+            <a:r>
+              <a:rPr lang="ru-RU" dirty="0" err="1"/>
+              <a:t>ТВЭЛов</a:t>
+            </a:r>
+            <a:r>
+              <a:rPr lang="ru-RU" dirty="0"/>
+              <a:t> </a:t>
+            </a:r>
+          </a:p>
+        </p:txBody>
+      </p:sp>
+      <p:pic>
+        <p:nvPicPr>
+          <p:cNvPr id="11" name="Рисунок 10">
+            <a:extLst>
+              <a:ext uri="{FF2B5EF4-FFF2-40B4-BE49-F238E27FC236}">
+                <a16:creationId xmlns:a16="http://schemas.microsoft.com/office/drawing/2014/main" id="{4C8CD5F2-A582-D844-A441-0BFA3A9C35CF}"/>
+              </a:ext>
+            </a:extLst>
+          </p:cNvPr>
+          <p:cNvPicPr>
+            <a:picLocks noChangeAspect="1"/>
+          </p:cNvPicPr>
+          <p:nvPr/>
+        </p:nvPicPr>
+        <p:blipFill>
+          <a:blip r:embed="rId4"/>
+          <a:stretch>
+            <a:fillRect/>
+          </a:stretch>
+        </p:blipFill>
+        <p:spPr>
+          <a:xfrm>
+            <a:off x="3706575" y="4561423"/>
+            <a:ext cx="6056045" cy="1030314"/>
+          </a:xfrm>
+          <a:prstGeom prst="rect">
+            <a:avLst/>
+          </a:prstGeom>
+        </p:spPr>
+      </p:pic>
+      <p:sp>
+        <p:nvSpPr>
+          <p:cNvPr id="12" name="TextBox 11">
+            <a:extLst>
+              <a:ext uri="{FF2B5EF4-FFF2-40B4-BE49-F238E27FC236}">
+                <a16:creationId xmlns:a16="http://schemas.microsoft.com/office/drawing/2014/main" id="{3D5034E1-D935-1747-98DD-E1FD3987FAAF}"/>
+              </a:ext>
+            </a:extLst>
+          </p:cNvPr>
+          <p:cNvSpPr txBox="1"/>
+          <p:nvPr/>
+        </p:nvSpPr>
+        <p:spPr>
+          <a:xfrm>
+            <a:off x="3556483" y="3994980"/>
+            <a:ext cx="6356227" cy="369332"/>
+          </a:xfrm>
+          <a:prstGeom prst="rect">
+            <a:avLst/>
+          </a:prstGeom>
+          <a:noFill/>
+        </p:spPr>
+        <p:txBody>
+          <a:bodyPr wrap="none" rtlCol="0">
+            <a:spAutoFit/>
+          </a:bodyPr>
+          <a:lstStyle/>
+          <a:p>
+            <a:r>
+              <a:rPr lang="ru-RU" dirty="0"/>
+              <a:t>Скорость выхода </a:t>
+            </a:r>
+            <a:r>
+              <a:rPr lang="en-US" dirty="0" err="1"/>
+              <a:t>i</a:t>
+            </a:r>
+            <a:r>
+              <a:rPr lang="en-US" dirty="0"/>
+              <a:t>-</a:t>
+            </a:r>
+            <a:r>
+              <a:rPr lang="ru-RU" dirty="0"/>
+              <a:t>ого радионуклида из-под оболочки </a:t>
+            </a:r>
+            <a:r>
+              <a:rPr lang="ru-RU" dirty="0" err="1"/>
+              <a:t>ТВЭЛов</a:t>
+            </a:r>
+            <a:r>
+              <a:rPr lang="ru-RU" dirty="0"/>
+              <a:t> </a:t>
+            </a:r>
+          </a:p>
+        </p:txBody>
+      </p:sp>
+      <p:sp>
+        <p:nvSpPr>
+          <p:cNvPr id="13" name="Номер слайда 12">
+            <a:extLst>
+              <a:ext uri="{FF2B5EF4-FFF2-40B4-BE49-F238E27FC236}">
+                <a16:creationId xmlns:a16="http://schemas.microsoft.com/office/drawing/2014/main" id="{4E19F07F-62ED-DF46-831F-C1E090688721}"/>
+              </a:ext>
+            </a:extLst>
+          </p:cNvPr>
+          <p:cNvSpPr>
+            <a:spLocks noGrp="1"/>
+          </p:cNvSpPr>
+          <p:nvPr>
+            <p:ph type="sldNum" sz="quarter" idx="12"/>
+          </p:nvPr>
+        </p:nvSpPr>
+        <p:spPr/>
+        <p:txBody>
+          <a:bodyPr/>
+          <a:lstStyle/>
+          <a:p>
+            <a:fld id="{BCF1BF90-A525-E342-BC2E-E63C1FF229A5}" type="slidenum">
+              <a:rPr lang="ru-RU" smtClean="0"/>
+              <a:t>14</a:t>
+            </a:fld>
+            <a:endParaRPr lang="ru-RU"/>
+          </a:p>
+        </p:txBody>
+      </p:sp>
+    </p:spTree>
+    <p:extLst>
+      <p:ext uri="{BB962C8B-B14F-4D97-AF65-F5344CB8AC3E}">
+        <p14:creationId xmlns:p14="http://schemas.microsoft.com/office/powerpoint/2010/main" val="1974201906"/>
+      </p:ext>
+    </p:extLst>
+  </p:cSld>
+  <p:clrMapOvr>
+    <a:masterClrMapping/>
+  </p:clrMapOvr>
+</p:sld>
+</file>
+
+<file path=ppt/slides/slide15.xml><?xml version="1.0" encoding="utf-8"?>
+<p:sld xmlns:a="http://schemas.openxmlformats.org/drawingml/2006/main" xmlns:r="http://schemas.openxmlformats.org/officeDocument/2006/relationships" xmlns:p="http://schemas.openxmlformats.org/presentationml/2006/main">
+  <p:cSld>
+    <p:spTree>
+      <p:nvGrpSpPr>
+        <p:cNvPr id="1" name=""/>
+        <p:cNvGrpSpPr/>
+        <p:nvPr/>
+      </p:nvGrpSpPr>
+      <p:grpSpPr>
+        <a:xfrm>
+          <a:off x="0" y="0"/>
+          <a:ext cx="0" cy="0"/>
+          <a:chOff x="0" y="0"/>
+          <a:chExt cx="0" cy="0"/>
+        </a:xfrm>
+      </p:grpSpPr>
+      <p:sp>
+        <p:nvSpPr>
+          <p:cNvPr id="2" name="Заголовок 1">
+            <a:extLst>
+              <a:ext uri="{FF2B5EF4-FFF2-40B4-BE49-F238E27FC236}">
+                <a16:creationId xmlns:a16="http://schemas.microsoft.com/office/drawing/2014/main" id="{D25D5D35-32AE-E24A-BEF8-729257E2AF34}"/>
+              </a:ext>
+            </a:extLst>
+          </p:cNvPr>
+          <p:cNvSpPr>
+            <a:spLocks noGrp="1"/>
+          </p:cNvSpPr>
+          <p:nvPr>
+            <p:ph type="title"/>
+          </p:nvPr>
+        </p:nvSpPr>
+        <p:spPr>
+          <a:xfrm>
+            <a:off x="2115398" y="365125"/>
+            <a:ext cx="9238401" cy="1325563"/>
+          </a:xfrm>
+        </p:spPr>
+        <p:txBody>
+          <a:bodyPr>
+            <a:normAutofit/>
+          </a:bodyPr>
+          <a:lstStyle/>
+          <a:p>
+            <a:pPr algn="ctr"/>
+            <a:r>
+              <a:rPr lang="ru-RU" sz="3600" b="1" dirty="0"/>
+              <a:t>Выход продуктов реакции деления из-под оболочки </a:t>
+            </a:r>
+            <a:r>
+              <a:rPr lang="ru-RU" sz="3600" b="1" dirty="0" err="1"/>
+              <a:t>ТВЭЛов</a:t>
+            </a:r>
+            <a:endParaRPr lang="ru-RU" sz="3600" dirty="0"/>
+          </a:p>
+        </p:txBody>
+      </p:sp>
+      <p:pic>
+        <p:nvPicPr>
+          <p:cNvPr id="4" name="Рисунок 3">
+            <a:extLst>
+              <a:ext uri="{FF2B5EF4-FFF2-40B4-BE49-F238E27FC236}">
+                <a16:creationId xmlns:a16="http://schemas.microsoft.com/office/drawing/2014/main" id="{502F6968-E10E-4141-B420-5D4FA93D3C15}"/>
+              </a:ext>
+            </a:extLst>
+          </p:cNvPr>
+          <p:cNvPicPr>
+            <a:picLocks noChangeAspect="1"/>
+          </p:cNvPicPr>
+          <p:nvPr/>
+        </p:nvPicPr>
+        <p:blipFill>
+          <a:blip r:embed="rId2" cstate="print">
+            <a:extLst>
+              <a:ext uri="{28A0092B-C50C-407E-A947-70E740481C1C}">
+                <a14:useLocalDpi xmlns:a14="http://schemas.microsoft.com/office/drawing/2010/main" val="0"/>
+              </a:ext>
+            </a:extLst>
+          </a:blip>
+          <a:stretch>
+            <a:fillRect/>
+          </a:stretch>
+        </p:blipFill>
+        <p:spPr>
+          <a:xfrm>
+            <a:off x="54000" y="104400"/>
+            <a:ext cx="2061399" cy="2023150"/>
+          </a:xfrm>
+          <a:prstGeom prst="rect">
+            <a:avLst/>
+          </a:prstGeom>
+        </p:spPr>
+      </p:pic>
+      <p:sp>
+        <p:nvSpPr>
+          <p:cNvPr id="5" name="Номер слайда 4">
+            <a:extLst>
+              <a:ext uri="{FF2B5EF4-FFF2-40B4-BE49-F238E27FC236}">
+                <a16:creationId xmlns:a16="http://schemas.microsoft.com/office/drawing/2014/main" id="{FE543E53-F376-DE40-A81A-ECFCEBE4AEEA}"/>
+              </a:ext>
+            </a:extLst>
+          </p:cNvPr>
+          <p:cNvSpPr>
+            <a:spLocks noGrp="1"/>
+          </p:cNvSpPr>
+          <p:nvPr>
+            <p:ph type="sldNum" sz="quarter" idx="12"/>
+          </p:nvPr>
+        </p:nvSpPr>
+        <p:spPr/>
+        <p:txBody>
+          <a:bodyPr/>
+          <a:lstStyle/>
+          <a:p>
+            <a:fld id="{BCF1BF90-A525-E342-BC2E-E63C1FF229A5}" type="slidenum">
+              <a:rPr lang="ru-RU" smtClean="0"/>
+              <a:t>15</a:t>
+            </a:fld>
+            <a:endParaRPr lang="ru-RU"/>
+          </a:p>
+        </p:txBody>
+      </p:sp>
+      <p:pic>
+        <p:nvPicPr>
+          <p:cNvPr id="18" name="Рисунок 17">
+            <a:extLst>
+              <a:ext uri="{FF2B5EF4-FFF2-40B4-BE49-F238E27FC236}">
+                <a16:creationId xmlns:a16="http://schemas.microsoft.com/office/drawing/2014/main" id="{AA4C9507-F8EE-874A-BFD3-16AB14651D4A}"/>
+              </a:ext>
+            </a:extLst>
+          </p:cNvPr>
+          <p:cNvPicPr>
+            <a:picLocks noChangeAspect="1"/>
+          </p:cNvPicPr>
+          <p:nvPr/>
+        </p:nvPicPr>
+        <p:blipFill>
+          <a:blip r:embed="rId3"/>
+          <a:stretch>
+            <a:fillRect/>
+          </a:stretch>
+        </p:blipFill>
+        <p:spPr>
+          <a:xfrm>
+            <a:off x="2981748" y="3007519"/>
+            <a:ext cx="7505700" cy="1016000"/>
+          </a:xfrm>
+          <a:prstGeom prst="rect">
+            <a:avLst/>
+          </a:prstGeom>
+        </p:spPr>
+      </p:pic>
+      <p:sp>
+        <p:nvSpPr>
+          <p:cNvPr id="20" name="TextBox 19">
+            <a:extLst>
+              <a:ext uri="{FF2B5EF4-FFF2-40B4-BE49-F238E27FC236}">
+                <a16:creationId xmlns:a16="http://schemas.microsoft.com/office/drawing/2014/main" id="{D3B02517-2F35-8945-BF84-FA36354CA4EB}"/>
+              </a:ext>
+            </a:extLst>
+          </p:cNvPr>
+          <p:cNvSpPr txBox="1"/>
+          <p:nvPr/>
+        </p:nvSpPr>
+        <p:spPr>
+          <a:xfrm>
+            <a:off x="2560570" y="2210772"/>
+            <a:ext cx="8348055" cy="646331"/>
+          </a:xfrm>
+          <a:prstGeom prst="rect">
+            <a:avLst/>
+          </a:prstGeom>
+          <a:noFill/>
+        </p:spPr>
+        <p:txBody>
+          <a:bodyPr wrap="none" rtlCol="0">
+            <a:spAutoFit/>
+          </a:bodyPr>
+          <a:lstStyle/>
+          <a:p>
+            <a:pPr algn="ctr"/>
+            <a:r>
+              <a:rPr lang="ru-RU" dirty="0"/>
+              <a:t>Конечная формула изменения концентрации </a:t>
+            </a:r>
+            <a:r>
+              <a:rPr lang="en-US" dirty="0" err="1"/>
+              <a:t>i</a:t>
+            </a:r>
+            <a:r>
+              <a:rPr lang="en-US" dirty="0"/>
+              <a:t>-</a:t>
+            </a:r>
+            <a:r>
+              <a:rPr lang="ru-RU" dirty="0"/>
+              <a:t>ого радионуклида в теплоносителе </a:t>
+            </a:r>
+          </a:p>
+          <a:p>
+            <a:pPr algn="ctr"/>
+            <a:r>
+              <a:rPr lang="ru-RU" dirty="0"/>
+              <a:t>первого контура в результате его миграции из-под оболочки </a:t>
+            </a:r>
+            <a:r>
+              <a:rPr lang="ru-RU" dirty="0" err="1"/>
+              <a:t>ТВЭЛов</a:t>
+            </a:r>
+            <a:endParaRPr lang="ru-RU" dirty="0"/>
+          </a:p>
+        </p:txBody>
+      </p:sp>
+    </p:spTree>
+    <p:extLst>
+      <p:ext uri="{BB962C8B-B14F-4D97-AF65-F5344CB8AC3E}">
+        <p14:creationId xmlns:p14="http://schemas.microsoft.com/office/powerpoint/2010/main" val="2583607111"/>
       </p:ext>
     </p:extLst>
   </p:cSld>
@@ -5729,6 +6879,35 @@
           </a:prstGeom>
         </p:spPr>
       </p:pic>
+      <p:sp>
+        <p:nvSpPr>
+          <p:cNvPr id="5" name="Номер слайда 4">
+            <a:extLst>
+              <a:ext uri="{FF2B5EF4-FFF2-40B4-BE49-F238E27FC236}">
+                <a16:creationId xmlns:a16="http://schemas.microsoft.com/office/drawing/2014/main" id="{6BEE7381-C0A9-6044-8DF1-5E4D8E311CB6}"/>
+              </a:ext>
+            </a:extLst>
+          </p:cNvPr>
+          <p:cNvSpPr>
+            <a:spLocks noGrp="1"/>
+          </p:cNvSpPr>
+          <p:nvPr>
+            <p:ph type="sldNum" sz="quarter" idx="12"/>
+          </p:nvPr>
+        </p:nvSpPr>
+        <p:spPr/>
+        <p:txBody>
+          <a:bodyPr/>
+          <a:lstStyle/>
+          <a:p>
+            <a:fld id="{BCF1BF90-A525-E342-BC2E-E63C1FF229A5}" type="slidenum">
+              <a:rPr lang="ru-RU" smtClean="0"/>
+              <a:t>2</a:t>
+            </a:fld>
+            <a:endParaRPr lang="ru-RU"/>
+          </a:p>
+        </p:txBody>
+      </p:sp>
     </p:spTree>
     <p:extLst>
       <p:ext uri="{BB962C8B-B14F-4D97-AF65-F5344CB8AC3E}">
@@ -5914,6 +7093,35 @@
           </a:prstGeom>
         </p:spPr>
       </p:pic>
+      <p:sp>
+        <p:nvSpPr>
+          <p:cNvPr id="5" name="Номер слайда 4">
+            <a:extLst>
+              <a:ext uri="{FF2B5EF4-FFF2-40B4-BE49-F238E27FC236}">
+                <a16:creationId xmlns:a16="http://schemas.microsoft.com/office/drawing/2014/main" id="{DDE5F22C-70D7-7948-BDB7-372F827EEC81}"/>
+              </a:ext>
+            </a:extLst>
+          </p:cNvPr>
+          <p:cNvSpPr>
+            <a:spLocks noGrp="1"/>
+          </p:cNvSpPr>
+          <p:nvPr>
+            <p:ph type="sldNum" sz="quarter" idx="12"/>
+          </p:nvPr>
+        </p:nvSpPr>
+        <p:spPr/>
+        <p:txBody>
+          <a:bodyPr/>
+          <a:lstStyle/>
+          <a:p>
+            <a:fld id="{BCF1BF90-A525-E342-BC2E-E63C1FF229A5}" type="slidenum">
+              <a:rPr lang="ru-RU" smtClean="0"/>
+              <a:t>3</a:t>
+            </a:fld>
+            <a:endParaRPr lang="ru-RU"/>
+          </a:p>
+        </p:txBody>
+      </p:sp>
     </p:spTree>
     <p:extLst>
       <p:ext uri="{BB962C8B-B14F-4D97-AF65-F5344CB8AC3E}">
@@ -6125,6 +7333,35 @@
           </a:p>
         </p:txBody>
       </p:sp>
+      <p:sp>
+        <p:nvSpPr>
+          <p:cNvPr id="7" name="Номер слайда 6">
+            <a:extLst>
+              <a:ext uri="{FF2B5EF4-FFF2-40B4-BE49-F238E27FC236}">
+                <a16:creationId xmlns:a16="http://schemas.microsoft.com/office/drawing/2014/main" id="{D391E3BD-7354-CD4A-8FB6-ED7140DB636A}"/>
+              </a:ext>
+            </a:extLst>
+          </p:cNvPr>
+          <p:cNvSpPr>
+            <a:spLocks noGrp="1"/>
+          </p:cNvSpPr>
+          <p:nvPr>
+            <p:ph type="sldNum" sz="quarter" idx="12"/>
+          </p:nvPr>
+        </p:nvSpPr>
+        <p:spPr/>
+        <p:txBody>
+          <a:bodyPr/>
+          <a:lstStyle/>
+          <a:p>
+            <a:fld id="{BCF1BF90-A525-E342-BC2E-E63C1FF229A5}" type="slidenum">
+              <a:rPr lang="ru-RU" smtClean="0"/>
+              <a:t>4</a:t>
+            </a:fld>
+            <a:endParaRPr lang="ru-RU"/>
+          </a:p>
+        </p:txBody>
+      </p:sp>
     </p:spTree>
     <p:extLst>
       <p:ext uri="{BB962C8B-B14F-4D97-AF65-F5344CB8AC3E}">
@@ -6289,6 +7526,35 @@
           </a:prstGeom>
         </p:spPr>
       </p:pic>
+      <p:sp>
+        <p:nvSpPr>
+          <p:cNvPr id="5" name="Номер слайда 4">
+            <a:extLst>
+              <a:ext uri="{FF2B5EF4-FFF2-40B4-BE49-F238E27FC236}">
+                <a16:creationId xmlns:a16="http://schemas.microsoft.com/office/drawing/2014/main" id="{9A036577-D925-9447-9E3C-10434FF72F14}"/>
+              </a:ext>
+            </a:extLst>
+          </p:cNvPr>
+          <p:cNvSpPr>
+            <a:spLocks noGrp="1"/>
+          </p:cNvSpPr>
+          <p:nvPr>
+            <p:ph type="sldNum" sz="quarter" idx="12"/>
+          </p:nvPr>
+        </p:nvSpPr>
+        <p:spPr/>
+        <p:txBody>
+          <a:bodyPr/>
+          <a:lstStyle/>
+          <a:p>
+            <a:fld id="{BCF1BF90-A525-E342-BC2E-E63C1FF229A5}" type="slidenum">
+              <a:rPr lang="ru-RU" smtClean="0"/>
+              <a:t>5</a:t>
+            </a:fld>
+            <a:endParaRPr lang="ru-RU"/>
+          </a:p>
+        </p:txBody>
+      </p:sp>
     </p:spTree>
     <p:extLst>
       <p:ext uri="{BB962C8B-B14F-4D97-AF65-F5344CB8AC3E}">
@@ -6422,6 +7688,35 @@
           </a:prstGeom>
         </p:spPr>
       </p:pic>
+      <p:sp>
+        <p:nvSpPr>
+          <p:cNvPr id="7" name="Номер слайда 6">
+            <a:extLst>
+              <a:ext uri="{FF2B5EF4-FFF2-40B4-BE49-F238E27FC236}">
+                <a16:creationId xmlns:a16="http://schemas.microsoft.com/office/drawing/2014/main" id="{05A0DAED-E02F-5246-A4E1-EA8F388435CB}"/>
+              </a:ext>
+            </a:extLst>
+          </p:cNvPr>
+          <p:cNvSpPr>
+            <a:spLocks noGrp="1"/>
+          </p:cNvSpPr>
+          <p:nvPr>
+            <p:ph type="sldNum" sz="quarter" idx="12"/>
+          </p:nvPr>
+        </p:nvSpPr>
+        <p:spPr/>
+        <p:txBody>
+          <a:bodyPr/>
+          <a:lstStyle/>
+          <a:p>
+            <a:fld id="{BCF1BF90-A525-E342-BC2E-E63C1FF229A5}" type="slidenum">
+              <a:rPr lang="ru-RU" smtClean="0"/>
+              <a:t>6</a:t>
+            </a:fld>
+            <a:endParaRPr lang="ru-RU"/>
+          </a:p>
+        </p:txBody>
+      </p:sp>
     </p:spTree>
     <p:extLst>
       <p:ext uri="{BB962C8B-B14F-4D97-AF65-F5344CB8AC3E}">
@@ -6554,6 +7849,35 @@
           </a:prstGeom>
         </p:spPr>
       </p:pic>
+      <p:sp>
+        <p:nvSpPr>
+          <p:cNvPr id="3" name="Номер слайда 2">
+            <a:extLst>
+              <a:ext uri="{FF2B5EF4-FFF2-40B4-BE49-F238E27FC236}">
+                <a16:creationId xmlns:a16="http://schemas.microsoft.com/office/drawing/2014/main" id="{B15FB2DF-1F77-0744-97AD-88FEBEB8CF1F}"/>
+              </a:ext>
+            </a:extLst>
+          </p:cNvPr>
+          <p:cNvSpPr>
+            <a:spLocks noGrp="1"/>
+          </p:cNvSpPr>
+          <p:nvPr>
+            <p:ph type="sldNum" sz="quarter" idx="12"/>
+          </p:nvPr>
+        </p:nvSpPr>
+        <p:spPr/>
+        <p:txBody>
+          <a:bodyPr/>
+          <a:lstStyle/>
+          <a:p>
+            <a:fld id="{BCF1BF90-A525-E342-BC2E-E63C1FF229A5}" type="slidenum">
+              <a:rPr lang="ru-RU" smtClean="0"/>
+              <a:t>7</a:t>
+            </a:fld>
+            <a:endParaRPr lang="ru-RU"/>
+          </a:p>
+        </p:txBody>
+      </p:sp>
     </p:spTree>
     <p:extLst>
       <p:ext uri="{BB962C8B-B14F-4D97-AF65-F5344CB8AC3E}">
@@ -7974,6 +9298,35 @@
           </a:p>
         </p:txBody>
       </p:sp>
+      <p:sp>
+        <p:nvSpPr>
+          <p:cNvPr id="3" name="Номер слайда 2">
+            <a:extLst>
+              <a:ext uri="{FF2B5EF4-FFF2-40B4-BE49-F238E27FC236}">
+                <a16:creationId xmlns:a16="http://schemas.microsoft.com/office/drawing/2014/main" id="{0B146CFF-4AD7-5D41-9FC5-D98C5FC612C3}"/>
+              </a:ext>
+            </a:extLst>
+          </p:cNvPr>
+          <p:cNvSpPr>
+            <a:spLocks noGrp="1"/>
+          </p:cNvSpPr>
+          <p:nvPr>
+            <p:ph type="sldNum" sz="quarter" idx="12"/>
+          </p:nvPr>
+        </p:nvSpPr>
+        <p:spPr/>
+        <p:txBody>
+          <a:bodyPr/>
+          <a:lstStyle/>
+          <a:p>
+            <a:fld id="{BCF1BF90-A525-E342-BC2E-E63C1FF229A5}" type="slidenum">
+              <a:rPr lang="ru-RU" smtClean="0"/>
+              <a:t>8</a:t>
+            </a:fld>
+            <a:endParaRPr lang="ru-RU"/>
+          </a:p>
+        </p:txBody>
+      </p:sp>
     </p:spTree>
     <p:extLst>
       <p:ext uri="{BB962C8B-B14F-4D97-AF65-F5344CB8AC3E}">
@@ -9018,6 +10371,35 @@
               <a:rPr lang="ru-RU" sz="2600" dirty="0"/>
               <a:t>Изотопы йода</a:t>
             </a:r>
+          </a:p>
+        </p:txBody>
+      </p:sp>
+      <p:sp>
+        <p:nvSpPr>
+          <p:cNvPr id="7" name="Номер слайда 6">
+            <a:extLst>
+              <a:ext uri="{FF2B5EF4-FFF2-40B4-BE49-F238E27FC236}">
+                <a16:creationId xmlns:a16="http://schemas.microsoft.com/office/drawing/2014/main" id="{C70C61C9-8C30-5045-B931-71BA88145523}"/>
+              </a:ext>
+            </a:extLst>
+          </p:cNvPr>
+          <p:cNvSpPr>
+            <a:spLocks noGrp="1"/>
+          </p:cNvSpPr>
+          <p:nvPr>
+            <p:ph type="sldNum" sz="quarter" idx="12"/>
+          </p:nvPr>
+        </p:nvSpPr>
+        <p:spPr/>
+        <p:txBody>
+          <a:bodyPr/>
+          <a:lstStyle/>
+          <a:p>
+            <a:fld id="{BCF1BF90-A525-E342-BC2E-E63C1FF229A5}" type="slidenum">
+              <a:rPr lang="ru-RU" smtClean="0"/>
+              <a:t>9</a:t>
+            </a:fld>
+            <a:endParaRPr lang="ru-RU"/>
           </a:p>
         </p:txBody>
       </p:sp>
@@ -9327,4 +10709,299 @@
     </a:ext>
   </a:extLst>
 </a:theme>
+</file>
+
+<file path=ppt/theme/theme2.xml><?xml version="1.0" encoding="utf-8"?>
+<a:theme xmlns:a="http://schemas.openxmlformats.org/drawingml/2006/main" name="Тема Office">
+  <a:themeElements>
+    <a:clrScheme name="Стандартная">
+      <a:dk1>
+        <a:sysClr val="windowText" lastClr="000000"/>
+      </a:dk1>
+      <a:lt1>
+        <a:sysClr val="window" lastClr="FFFFFF"/>
+      </a:lt1>
+      <a:dk2>
+        <a:srgbClr val="44546A"/>
+      </a:dk2>
+      <a:lt2>
+        <a:srgbClr val="E7E6E6"/>
+      </a:lt2>
+      <a:accent1>
+        <a:srgbClr val="4472C4"/>
+      </a:accent1>
+      <a:accent2>
+        <a:srgbClr val="ED7D31"/>
+      </a:accent2>
+      <a:accent3>
+        <a:srgbClr val="A5A5A5"/>
+      </a:accent3>
+      <a:accent4>
+        <a:srgbClr val="FFC000"/>
+      </a:accent4>
+      <a:accent5>
+        <a:srgbClr val="5B9BD5"/>
+      </a:accent5>
+      <a:accent6>
+        <a:srgbClr val="70AD47"/>
+      </a:accent6>
+      <a:hlink>
+        <a:srgbClr val="0563C1"/>
+      </a:hlink>
+      <a:folHlink>
+        <a:srgbClr val="954F72"/>
+      </a:folHlink>
+    </a:clrScheme>
+    <a:fontScheme name="Стандартная">
+      <a:majorFont>
+        <a:latin typeface="Calibri Light" panose="020F0302020204030204"/>
+        <a:ea typeface=""/>
+        <a:cs typeface=""/>
+        <a:font script="Jpan" typeface="游ゴシック Light"/>
+        <a:font script="Hang" typeface="맑은 고딕"/>
+        <a:font script="Hans" typeface="等线 Light"/>
+        <a:font script="Hant" typeface="新細明體"/>
+        <a:font script="Arab" typeface="Times New Roman"/>
+        <a:font script="Hebr" typeface="Times New Roman"/>
+        <a:font script="Thai" typeface="Angsana New"/>
+        <a:font script="Ethi" typeface="Nyala"/>
+        <a:font script="Beng" typeface="Vrinda"/>
+        <a:font script="Gujr" typeface="Shruti"/>
+        <a:font script="Khmr" typeface="MoolBoran"/>
+        <a:font script="Knda" typeface="Tunga"/>
+        <a:font script="Guru" typeface="Raavi"/>
+        <a:font script="Cans" typeface="Euphemia"/>
+        <a:font script="Cher" typeface="Plantagenet Cherokee"/>
+        <a:font script="Yiii" typeface="Microsoft Yi Baiti"/>
+        <a:font script="Tibt" typeface="Microsoft Himalaya"/>
+        <a:font script="Thaa" typeface="MV Boli"/>
+        <a:font script="Deva" typeface="Mangal"/>
+        <a:font script="Telu" typeface="Gautami"/>
+        <a:font script="Taml" typeface="Latha"/>
+        <a:font script="Syrc" typeface="Estrangelo Edessa"/>
+        <a:font script="Orya" typeface="Kalinga"/>
+        <a:font script="Mlym" typeface="Kartika"/>
+        <a:font script="Laoo" typeface="DokChampa"/>
+        <a:font script="Sinh" typeface="Iskoola Pota"/>
+        <a:font script="Mong" typeface="Mongolian Baiti"/>
+        <a:font script="Viet" typeface="Times New Roman"/>
+        <a:font script="Uigh" typeface="Microsoft Uighur"/>
+        <a:font script="Geor" typeface="Sylfaen"/>
+        <a:font script="Armn" typeface="Arial"/>
+        <a:font script="Bugi" typeface="Leelawadee UI"/>
+        <a:font script="Bopo" typeface="Microsoft JhengHei"/>
+        <a:font script="Java" typeface="Javanese Text"/>
+        <a:font script="Lisu" typeface="Segoe UI"/>
+        <a:font script="Mymr" typeface="Myanmar Text"/>
+        <a:font script="Nkoo" typeface="Ebrima"/>
+        <a:font script="Olck" typeface="Nirmala UI"/>
+        <a:font script="Osma" typeface="Ebrima"/>
+        <a:font script="Phag" typeface="Phagspa"/>
+        <a:font script="Syrn" typeface="Estrangelo Edessa"/>
+        <a:font script="Syrj" typeface="Estrangelo Edessa"/>
+        <a:font script="Syre" typeface="Estrangelo Edessa"/>
+        <a:font script="Sora" typeface="Nirmala UI"/>
+        <a:font script="Tale" typeface="Microsoft Tai Le"/>
+        <a:font script="Talu" typeface="Microsoft New Tai Lue"/>
+        <a:font script="Tfng" typeface="Ebrima"/>
+      </a:majorFont>
+      <a:minorFont>
+        <a:latin typeface="Calibri" panose="020F0502020204030204"/>
+        <a:ea typeface=""/>
+        <a:cs typeface=""/>
+        <a:font script="Jpan" typeface="游ゴシック"/>
+        <a:font script="Hang" typeface="맑은 고딕"/>
+        <a:font script="Hans" typeface="等线"/>
+        <a:font script="Hant" typeface="新細明體"/>
+        <a:font script="Arab" typeface="Arial"/>
+        <a:font script="Hebr" typeface="Arial"/>
+        <a:font script="Thai" typeface="Cordia New"/>
+        <a:font script="Ethi" typeface="Nyala"/>
+        <a:font script="Beng" typeface="Vrinda"/>
+        <a:font script="Gujr" typeface="Shruti"/>
+        <a:font script="Khmr" typeface="DaunPenh"/>
+        <a:font script="Knda" typeface="Tunga"/>
+        <a:font script="Guru" typeface="Raavi"/>
+        <a:font script="Cans" typeface="Euphemia"/>
+        <a:font script="Cher" typeface="Plantagenet Cherokee"/>
+        <a:font script="Yiii" typeface="Microsoft Yi Baiti"/>
+        <a:font script="Tibt" typeface="Microsoft Himalaya"/>
+        <a:font script="Thaa" typeface="MV Boli"/>
+        <a:font script="Deva" typeface="Mangal"/>
+        <a:font script="Telu" typeface="Gautami"/>
+        <a:font script="Taml" typeface="Latha"/>
+        <a:font script="Syrc" typeface="Estrangelo Edessa"/>
+        <a:font script="Orya" typeface="Kalinga"/>
+        <a:font script="Mlym" typeface="Kartika"/>
+        <a:font script="Laoo" typeface="DokChampa"/>
+        <a:font script="Sinh" typeface="Iskoola Pota"/>
+        <a:font script="Mong" typeface="Mongolian Baiti"/>
+        <a:font script="Viet" typeface="Arial"/>
+        <a:font script="Uigh" typeface="Microsoft Uighur"/>
+        <a:font script="Geor" typeface="Sylfaen"/>
+        <a:font script="Armn" typeface="Arial"/>
+        <a:font script="Bugi" typeface="Leelawadee UI"/>
+        <a:font script="Bopo" typeface="Microsoft JhengHei"/>
+        <a:font script="Java" typeface="Javanese Text"/>
+        <a:font script="Lisu" typeface="Segoe UI"/>
+        <a:font script="Mymr" typeface="Myanmar Text"/>
+        <a:font script="Nkoo" typeface="Ebrima"/>
+        <a:font script="Olck" typeface="Nirmala UI"/>
+        <a:font script="Osma" typeface="Ebrima"/>
+        <a:font script="Phag" typeface="Phagspa"/>
+        <a:font script="Syrn" typeface="Estrangelo Edessa"/>
+        <a:font script="Syrj" typeface="Estrangelo Edessa"/>
+        <a:font script="Syre" typeface="Estrangelo Edessa"/>
+        <a:font script="Sora" typeface="Nirmala UI"/>
+        <a:font script="Tale" typeface="Microsoft Tai Le"/>
+        <a:font script="Talu" typeface="Microsoft New Tai Lue"/>
+        <a:font script="Tfng" typeface="Ebrima"/>
+      </a:minorFont>
+    </a:fontScheme>
+    <a:fmtScheme name="Стандартная">
+      <a:fillStyleLst>
+        <a:solidFill>
+          <a:schemeClr val="phClr"/>
+        </a:solidFill>
+        <a:gradFill rotWithShape="1">
+          <a:gsLst>
+            <a:gs pos="0">
+              <a:schemeClr val="phClr">
+                <a:lumMod val="110000"/>
+                <a:satMod val="105000"/>
+                <a:tint val="67000"/>
+              </a:schemeClr>
+            </a:gs>
+            <a:gs pos="50000">
+              <a:schemeClr val="phClr">
+                <a:lumMod val="105000"/>
+                <a:satMod val="103000"/>
+                <a:tint val="73000"/>
+              </a:schemeClr>
+            </a:gs>
+            <a:gs pos="100000">
+              <a:schemeClr val="phClr">
+                <a:lumMod val="105000"/>
+                <a:satMod val="109000"/>
+                <a:tint val="81000"/>
+              </a:schemeClr>
+            </a:gs>
+          </a:gsLst>
+          <a:lin ang="5400000" scaled="0"/>
+        </a:gradFill>
+        <a:gradFill rotWithShape="1">
+          <a:gsLst>
+            <a:gs pos="0">
+              <a:schemeClr val="phClr">
+                <a:satMod val="103000"/>
+                <a:lumMod val="102000"/>
+                <a:tint val="94000"/>
+              </a:schemeClr>
+            </a:gs>
+            <a:gs pos="50000">
+              <a:schemeClr val="phClr">
+                <a:satMod val="110000"/>
+                <a:lumMod val="100000"/>
+                <a:shade val="100000"/>
+              </a:schemeClr>
+            </a:gs>
+            <a:gs pos="100000">
+              <a:schemeClr val="phClr">
+                <a:lumMod val="99000"/>
+                <a:satMod val="120000"/>
+                <a:shade val="78000"/>
+              </a:schemeClr>
+            </a:gs>
+          </a:gsLst>
+          <a:lin ang="5400000" scaled="0"/>
+        </a:gradFill>
+      </a:fillStyleLst>
+      <a:lnStyleLst>
+        <a:ln w="6350" cap="flat" cmpd="sng" algn="ctr">
+          <a:solidFill>
+            <a:schemeClr val="phClr"/>
+          </a:solidFill>
+          <a:prstDash val="solid"/>
+          <a:miter lim="800000"/>
+        </a:ln>
+        <a:ln w="12700" cap="flat" cmpd="sng" algn="ctr">
+          <a:solidFill>
+            <a:schemeClr val="phClr"/>
+          </a:solidFill>
+          <a:prstDash val="solid"/>
+          <a:miter lim="800000"/>
+        </a:ln>
+        <a:ln w="19050" cap="flat" cmpd="sng" algn="ctr">
+          <a:solidFill>
+            <a:schemeClr val="phClr"/>
+          </a:solidFill>
+          <a:prstDash val="solid"/>
+          <a:miter lim="800000"/>
+        </a:ln>
+      </a:lnStyleLst>
+      <a:effectStyleLst>
+        <a:effectStyle>
+          <a:effectLst/>
+        </a:effectStyle>
+        <a:effectStyle>
+          <a:effectLst/>
+        </a:effectStyle>
+        <a:effectStyle>
+          <a:effectLst>
+            <a:outerShdw blurRad="57150" dist="19050" dir="5400000" algn="ctr" rotWithShape="0">
+              <a:srgbClr val="000000">
+                <a:alpha val="63000"/>
+              </a:srgbClr>
+            </a:outerShdw>
+          </a:effectLst>
+        </a:effectStyle>
+      </a:effectStyleLst>
+      <a:bgFillStyleLst>
+        <a:solidFill>
+          <a:schemeClr val="phClr"/>
+        </a:solidFill>
+        <a:solidFill>
+          <a:schemeClr val="phClr">
+            <a:tint val="95000"/>
+            <a:satMod val="170000"/>
+          </a:schemeClr>
+        </a:solidFill>
+        <a:gradFill rotWithShape="1">
+          <a:gsLst>
+            <a:gs pos="0">
+              <a:schemeClr val="phClr">
+                <a:tint val="93000"/>
+                <a:satMod val="150000"/>
+                <a:shade val="98000"/>
+                <a:lumMod val="102000"/>
+              </a:schemeClr>
+            </a:gs>
+            <a:gs pos="50000">
+              <a:schemeClr val="phClr">
+                <a:tint val="98000"/>
+                <a:satMod val="130000"/>
+                <a:shade val="90000"/>
+                <a:lumMod val="103000"/>
+              </a:schemeClr>
+            </a:gs>
+            <a:gs pos="100000">
+              <a:schemeClr val="phClr">
+                <a:shade val="63000"/>
+                <a:satMod val="120000"/>
+              </a:schemeClr>
+            </a:gs>
+          </a:gsLst>
+          <a:lin ang="5400000" scaled="0"/>
+        </a:gradFill>
+      </a:bgFillStyleLst>
+    </a:fmtScheme>
+  </a:themeElements>
+  <a:objectDefaults/>
+  <a:extraClrSchemeLst/>
+  <a:extLst>
+    <a:ext uri="{05A4C25C-085E-4340-85A3-A5531E510DB2}">
+      <thm15:themeFamily xmlns:thm15="http://schemas.microsoft.com/office/thememl/2012/main" name="Office Theme" id="{62F939B6-93AF-4DB8-9C6B-D6C7DFDC589F}" vid="{4A3C46E8-61CC-4603-A589-7422A47A8E4A}"/>
+    </a:ext>
+  </a:extLst>
+</a:theme>
 </file>
</xml_diff>

<commit_message>
Completed coolant activasion part in presentation
</commit_message>
<xml_diff>
--- a/practice/presentation/practice.pptx
+++ b/practice/presentation/practice.pptx
@@ -5,7 +5,7 @@
     <p:sldMasterId id="2147483648" r:id="rId1"/>
   </p:sldMasterIdLst>
   <p:notesMasterIdLst>
-    <p:notesMasterId r:id="rId17"/>
+    <p:notesMasterId r:id="rId19"/>
   </p:notesMasterIdLst>
   <p:sldIdLst>
     <p:sldId id="256" r:id="rId2"/>
@@ -23,6 +23,8 @@
     <p:sldId id="268" r:id="rId14"/>
     <p:sldId id="269" r:id="rId15"/>
     <p:sldId id="270" r:id="rId16"/>
+    <p:sldId id="271" r:id="rId17"/>
+    <p:sldId id="272" r:id="rId18"/>
   </p:sldIdLst>
   <p:sldSz cx="12192000" cy="6858000"/>
   <p:notesSz cx="6858000" cy="9144000"/>
@@ -3836,8 +3838,8 @@
           </a:prstGeom>
         </p:spPr>
       </p:pic>
-      <mc:AlternateContent xmlns:mc="http://schemas.openxmlformats.org/markup-compatibility/2006">
-        <mc:Choice xmlns:a14="http://schemas.microsoft.com/office/drawing/2010/main" Requires="a14">
+      <mc:AlternateContent xmlns:mc="http://schemas.openxmlformats.org/markup-compatibility/2006" xmlns:a14="http://schemas.microsoft.com/office/drawing/2010/main">
+        <mc:Choice Requires="a14">
           <p:graphicFrame>
             <p:nvGraphicFramePr>
               <p:cNvPr id="5" name="Таблица 4">
@@ -4081,13 +4083,7 @@
                                       <a:rPr lang="en-US" b="0" i="1" smtClean="0">
                                         <a:latin typeface="Cambria Math" panose="02040503050406030204" pitchFamily="18" charset="0"/>
                                       </a:rPr>
-                                      <m:t>13</m:t>
-                                    </m:r>
-                                    <m:r>
-                                      <a:rPr lang="en-US" b="0" i="1" smtClean="0">
-                                        <a:latin typeface="Cambria Math" panose="02040503050406030204" pitchFamily="18" charset="0"/>
-                                      </a:rPr>
-                                      <m:t>4</m:t>
+                                      <m:t>134</m:t>
                                     </m:r>
                                   </m:sup>
                                   <m:e>
@@ -4178,13 +4174,7 @@
                                       <a:rPr lang="en-US" b="0" i="1" smtClean="0">
                                         <a:latin typeface="Cambria Math" panose="02040503050406030204" pitchFamily="18" charset="0"/>
                                       </a:rPr>
-                                      <m:t>13</m:t>
-                                    </m:r>
-                                    <m:r>
-                                      <a:rPr lang="en-US" b="0" i="1" smtClean="0">
-                                        <a:latin typeface="Cambria Math" panose="02040503050406030204" pitchFamily="18" charset="0"/>
-                                      </a:rPr>
-                                      <m:t>7</m:t>
+                                      <m:t>137</m:t>
                                     </m:r>
                                   </m:sup>
                                   <m:e>
@@ -4267,13 +4257,7 @@
                                       <a:rPr lang="en-US" b="0" i="1" smtClean="0">
                                         <a:latin typeface="Cambria Math" panose="02040503050406030204" pitchFamily="18" charset="0"/>
                                       </a:rPr>
-                                      <m:t>13</m:t>
-                                    </m:r>
-                                    <m:r>
-                                      <a:rPr lang="en-US" b="0" i="1" smtClean="0">
-                                        <a:latin typeface="Cambria Math" panose="02040503050406030204" pitchFamily="18" charset="0"/>
-                                      </a:rPr>
-                                      <m:t>8</m:t>
+                                      <m:t>138</m:t>
                                     </m:r>
                                   </m:sup>
                                   <m:e>
@@ -4417,7 +4401,7 @@
             </a:graphic>
           </p:graphicFrame>
         </mc:Choice>
-        <mc:Fallback>
+        <mc:Fallback xmlns="">
           <p:graphicFrame>
             <p:nvGraphicFramePr>
               <p:cNvPr id="5" name="Таблица 4">
@@ -4870,8 +4854,8 @@
           </a:p>
         </p:txBody>
       </p:sp>
-      <mc:AlternateContent xmlns:mc="http://schemas.openxmlformats.org/markup-compatibility/2006">
-        <mc:Choice xmlns:a14="http://schemas.microsoft.com/office/drawing/2010/main" Requires="a14">
+      <mc:AlternateContent xmlns:mc="http://schemas.openxmlformats.org/markup-compatibility/2006" xmlns:a14="http://schemas.microsoft.com/office/drawing/2010/main">
+        <mc:Choice Requires="a14">
           <p:graphicFrame>
             <p:nvGraphicFramePr>
               <p:cNvPr id="4" name="Таблица 3">
@@ -5023,13 +5007,7 @@
                                       <a:rPr lang="en-US" b="0" i="1" smtClean="0">
                                         <a:latin typeface="Cambria Math" panose="02040503050406030204" pitchFamily="18" charset="0"/>
                                       </a:rPr>
-                                      <m:t>1</m:t>
-                                    </m:r>
-                                    <m:r>
-                                      <a:rPr lang="en-US" b="0" i="1" smtClean="0">
-                                        <a:latin typeface="Cambria Math" panose="02040503050406030204" pitchFamily="18" charset="0"/>
-                                      </a:rPr>
-                                      <m:t>6</m:t>
+                                      <m:t>16</m:t>
                                     </m:r>
                                   </m:sup>
                                   <m:e>
@@ -5207,13 +5185,7 @@
                                       <a:rPr lang="en-US" b="0" i="1" smtClean="0">
                                         <a:latin typeface="Cambria Math" panose="02040503050406030204" pitchFamily="18" charset="0"/>
                                       </a:rPr>
-                                      <m:t>1</m:t>
-                                    </m:r>
-                                    <m:r>
-                                      <a:rPr lang="en-US" b="0" i="1" smtClean="0">
-                                        <a:latin typeface="Cambria Math" panose="02040503050406030204" pitchFamily="18" charset="0"/>
-                                      </a:rPr>
-                                      <m:t>4</m:t>
+                                      <m:t>14</m:t>
                                     </m:r>
                                   </m:sup>
                                   <m:e>
@@ -5349,7 +5321,7 @@
             </a:graphic>
           </p:graphicFrame>
         </mc:Choice>
-        <mc:Fallback>
+        <mc:Fallback xmlns="">
           <p:graphicFrame>
             <p:nvGraphicFramePr>
               <p:cNvPr id="4" name="Таблица 3">
@@ -6383,7 +6355,7 @@
             </a:r>
             <a:r>
               <a:rPr lang="ru-RU" dirty="0" err="1"/>
-              <a:t>ТВЭЛов</a:t>
+              <a:t>ТВЭЛа</a:t>
             </a:r>
             <a:r>
               <a:rPr lang="ru-RU" dirty="0"/>
@@ -6468,7 +6440,7 @@
             </a:r>
             <a:r>
               <a:rPr lang="ru-RU" dirty="0" err="1"/>
-              <a:t>ТВЭЛов</a:t>
+              <a:t>ТВЭЛа</a:t>
             </a:r>
             <a:r>
               <a:rPr lang="ru-RU" dirty="0"/>
@@ -6726,7 +6698,7 @@
             </a:r>
             <a:r>
               <a:rPr lang="ru-RU" dirty="0" err="1"/>
-              <a:t>ТВЭЛов</a:t>
+              <a:t>ТВЭЛа</a:t>
             </a:r>
             <a:endParaRPr lang="ru-RU" dirty="0"/>
           </a:p>
@@ -6736,6 +6708,596 @@
     <p:extLst>
       <p:ext uri="{BB962C8B-B14F-4D97-AF65-F5344CB8AC3E}">
         <p14:creationId xmlns:p14="http://schemas.microsoft.com/office/powerpoint/2010/main" val="2583607111"/>
+      </p:ext>
+    </p:extLst>
+  </p:cSld>
+  <p:clrMapOvr>
+    <a:masterClrMapping/>
+  </p:clrMapOvr>
+</p:sld>
+</file>
+
+<file path=ppt/slides/slide16.xml><?xml version="1.0" encoding="utf-8"?>
+<p:sld xmlns:a="http://schemas.openxmlformats.org/drawingml/2006/main" xmlns:r="http://schemas.openxmlformats.org/officeDocument/2006/relationships" xmlns:p="http://schemas.openxmlformats.org/presentationml/2006/main">
+  <p:cSld>
+    <p:spTree>
+      <p:nvGrpSpPr>
+        <p:cNvPr id="1" name=""/>
+        <p:cNvGrpSpPr/>
+        <p:nvPr/>
+      </p:nvGrpSpPr>
+      <p:grpSpPr>
+        <a:xfrm>
+          <a:off x="0" y="0"/>
+          <a:ext cx="0" cy="0"/>
+          <a:chOff x="0" y="0"/>
+          <a:chExt cx="0" cy="0"/>
+        </a:xfrm>
+      </p:grpSpPr>
+      <p:sp>
+        <p:nvSpPr>
+          <p:cNvPr id="2" name="Заголовок 1">
+            <a:extLst>
+              <a:ext uri="{FF2B5EF4-FFF2-40B4-BE49-F238E27FC236}">
+                <a16:creationId xmlns:a16="http://schemas.microsoft.com/office/drawing/2014/main" id="{D87FE843-E605-7D46-B83D-D137CC5DF0B2}"/>
+              </a:ext>
+            </a:extLst>
+          </p:cNvPr>
+          <p:cNvSpPr>
+            <a:spLocks noGrp="1"/>
+          </p:cNvSpPr>
+          <p:nvPr>
+            <p:ph type="title"/>
+          </p:nvPr>
+        </p:nvSpPr>
+        <p:spPr>
+          <a:xfrm>
+            <a:off x="2115399" y="365125"/>
+            <a:ext cx="9238401" cy="1325563"/>
+          </a:xfrm>
+        </p:spPr>
+        <p:txBody>
+          <a:bodyPr>
+            <a:normAutofit/>
+          </a:bodyPr>
+          <a:lstStyle/>
+          <a:p>
+            <a:pPr algn="ctr"/>
+            <a:r>
+              <a:rPr lang="ru-RU" sz="3600" b="1" dirty="0"/>
+              <a:t>Облучение естественных примесей теплоносителя и продуктов коррозии </a:t>
+            </a:r>
+            <a:endParaRPr lang="ru-RU" sz="3600" dirty="0"/>
+          </a:p>
+        </p:txBody>
+      </p:sp>
+      <p:sp>
+        <p:nvSpPr>
+          <p:cNvPr id="4" name="Номер слайда 3">
+            <a:extLst>
+              <a:ext uri="{FF2B5EF4-FFF2-40B4-BE49-F238E27FC236}">
+                <a16:creationId xmlns:a16="http://schemas.microsoft.com/office/drawing/2014/main" id="{05F8AFC9-41CD-074B-8F5D-A45AC0CE93B4}"/>
+              </a:ext>
+            </a:extLst>
+          </p:cNvPr>
+          <p:cNvSpPr>
+            <a:spLocks noGrp="1"/>
+          </p:cNvSpPr>
+          <p:nvPr>
+            <p:ph type="sldNum" sz="quarter" idx="12"/>
+          </p:nvPr>
+        </p:nvSpPr>
+        <p:spPr/>
+        <p:txBody>
+          <a:bodyPr/>
+          <a:lstStyle/>
+          <a:p>
+            <a:fld id="{BCF1BF90-A525-E342-BC2E-E63C1FF229A5}" type="slidenum">
+              <a:rPr lang="ru-RU" smtClean="0"/>
+              <a:t>16</a:t>
+            </a:fld>
+            <a:endParaRPr lang="ru-RU"/>
+          </a:p>
+        </p:txBody>
+      </p:sp>
+      <p:pic>
+        <p:nvPicPr>
+          <p:cNvPr id="5" name="Рисунок 4">
+            <a:extLst>
+              <a:ext uri="{FF2B5EF4-FFF2-40B4-BE49-F238E27FC236}">
+                <a16:creationId xmlns:a16="http://schemas.microsoft.com/office/drawing/2014/main" id="{C4726C4E-6D07-0C42-9D73-2FEEA6B0435D}"/>
+              </a:ext>
+            </a:extLst>
+          </p:cNvPr>
+          <p:cNvPicPr>
+            <a:picLocks noChangeAspect="1"/>
+          </p:cNvPicPr>
+          <p:nvPr/>
+        </p:nvPicPr>
+        <p:blipFill>
+          <a:blip r:embed="rId2" cstate="print">
+            <a:extLst>
+              <a:ext uri="{28A0092B-C50C-407E-A947-70E740481C1C}">
+                <a14:useLocalDpi xmlns:a14="http://schemas.microsoft.com/office/drawing/2010/main" val="0"/>
+              </a:ext>
+            </a:extLst>
+          </a:blip>
+          <a:stretch>
+            <a:fillRect/>
+          </a:stretch>
+        </p:blipFill>
+        <p:spPr>
+          <a:xfrm>
+            <a:off x="54000" y="104400"/>
+            <a:ext cx="2061399" cy="2023150"/>
+          </a:xfrm>
+          <a:prstGeom prst="rect">
+            <a:avLst/>
+          </a:prstGeom>
+        </p:spPr>
+      </p:pic>
+      <p:pic>
+        <p:nvPicPr>
+          <p:cNvPr id="8" name="Рисунок 7">
+            <a:extLst>
+              <a:ext uri="{FF2B5EF4-FFF2-40B4-BE49-F238E27FC236}">
+                <a16:creationId xmlns:a16="http://schemas.microsoft.com/office/drawing/2014/main" id="{7EEDBCDB-5AB7-1F4A-BA3D-9AA192C1BF89}"/>
+              </a:ext>
+            </a:extLst>
+          </p:cNvPr>
+          <p:cNvPicPr>
+            <a:picLocks noChangeAspect="1"/>
+          </p:cNvPicPr>
+          <p:nvPr/>
+        </p:nvPicPr>
+        <p:blipFill>
+          <a:blip r:embed="rId3"/>
+          <a:stretch>
+            <a:fillRect/>
+          </a:stretch>
+        </p:blipFill>
+        <p:spPr>
+          <a:xfrm>
+            <a:off x="5451504" y="4638141"/>
+            <a:ext cx="2566190" cy="1313960"/>
+          </a:xfrm>
+          <a:prstGeom prst="rect">
+            <a:avLst/>
+          </a:prstGeom>
+        </p:spPr>
+      </p:pic>
+      <p:sp>
+        <p:nvSpPr>
+          <p:cNvPr id="9" name="TextBox 8">
+            <a:extLst>
+              <a:ext uri="{FF2B5EF4-FFF2-40B4-BE49-F238E27FC236}">
+                <a16:creationId xmlns:a16="http://schemas.microsoft.com/office/drawing/2014/main" id="{6160F5DB-E9CB-7D4E-A259-BA54D51F4BA1}"/>
+              </a:ext>
+            </a:extLst>
+          </p:cNvPr>
+          <p:cNvSpPr txBox="1"/>
+          <p:nvPr/>
+        </p:nvSpPr>
+        <p:spPr>
+          <a:xfrm>
+            <a:off x="3569310" y="4034501"/>
+            <a:ext cx="6330579" cy="646331"/>
+          </a:xfrm>
+          <a:prstGeom prst="rect">
+            <a:avLst/>
+          </a:prstGeom>
+          <a:noFill/>
+        </p:spPr>
+        <p:txBody>
+          <a:bodyPr wrap="none" rtlCol="0">
+            <a:spAutoFit/>
+          </a:bodyPr>
+          <a:lstStyle/>
+          <a:p>
+            <a:pPr algn="ctr"/>
+            <a:r>
+              <a:rPr lang="ru-RU" dirty="0"/>
+              <a:t>Массовая концентрация </a:t>
+            </a:r>
+            <a:r>
+              <a:rPr lang="en-US" dirty="0" err="1"/>
+              <a:t>i</a:t>
+            </a:r>
+            <a:r>
+              <a:rPr lang="en-US" dirty="0"/>
+              <a:t>-</a:t>
+            </a:r>
+            <a:r>
+              <a:rPr lang="ru-RU" dirty="0"/>
+              <a:t>ого нуклида естественной примеси</a:t>
+            </a:r>
+          </a:p>
+          <a:p>
+            <a:pPr algn="ctr"/>
+            <a:endParaRPr lang="ru-RU" dirty="0"/>
+          </a:p>
+        </p:txBody>
+      </p:sp>
+      <p:pic>
+        <p:nvPicPr>
+          <p:cNvPr id="11" name="Рисунок 10">
+            <a:extLst>
+              <a:ext uri="{FF2B5EF4-FFF2-40B4-BE49-F238E27FC236}">
+                <a16:creationId xmlns:a16="http://schemas.microsoft.com/office/drawing/2014/main" id="{A034538E-AC74-8A4F-918C-A28F795D74CE}"/>
+              </a:ext>
+            </a:extLst>
+          </p:cNvPr>
+          <p:cNvPicPr>
+            <a:picLocks noChangeAspect="1"/>
+          </p:cNvPicPr>
+          <p:nvPr/>
+        </p:nvPicPr>
+        <p:blipFill>
+          <a:blip r:embed="rId4"/>
+          <a:stretch>
+            <a:fillRect/>
+          </a:stretch>
+        </p:blipFill>
+        <p:spPr>
+          <a:xfrm>
+            <a:off x="4507195" y="2491720"/>
+            <a:ext cx="4454808" cy="1421554"/>
+          </a:xfrm>
+          <a:prstGeom prst="rect">
+            <a:avLst/>
+          </a:prstGeom>
+        </p:spPr>
+      </p:pic>
+      <p:sp>
+        <p:nvSpPr>
+          <p:cNvPr id="12" name="TextBox 11">
+            <a:extLst>
+              <a:ext uri="{FF2B5EF4-FFF2-40B4-BE49-F238E27FC236}">
+                <a16:creationId xmlns:a16="http://schemas.microsoft.com/office/drawing/2014/main" id="{4791838C-134A-054D-BA98-BA362C2FCB82}"/>
+              </a:ext>
+            </a:extLst>
+          </p:cNvPr>
+          <p:cNvSpPr txBox="1"/>
+          <p:nvPr/>
+        </p:nvSpPr>
+        <p:spPr>
+          <a:xfrm>
+            <a:off x="1774748" y="2006323"/>
+            <a:ext cx="9919703" cy="646331"/>
+          </a:xfrm>
+          <a:prstGeom prst="rect">
+            <a:avLst/>
+          </a:prstGeom>
+          <a:noFill/>
+        </p:spPr>
+        <p:txBody>
+          <a:bodyPr wrap="none" rtlCol="0">
+            <a:spAutoFit/>
+          </a:bodyPr>
+          <a:lstStyle/>
+          <a:p>
+            <a:pPr algn="ctr"/>
+            <a:r>
+              <a:rPr lang="ru-RU" dirty="0"/>
+              <a:t>Скорость изменения концентрация </a:t>
+            </a:r>
+            <a:r>
+              <a:rPr lang="en-US" dirty="0" err="1"/>
+              <a:t>i</a:t>
+            </a:r>
+            <a:r>
+              <a:rPr lang="en-US" dirty="0"/>
+              <a:t>-</a:t>
+            </a:r>
+            <a:r>
+              <a:rPr lang="ru-RU" dirty="0"/>
+              <a:t>ого радионуклида, образующегося в результате облучения </a:t>
+            </a:r>
+          </a:p>
+          <a:p>
+            <a:pPr algn="ctr"/>
+            <a:r>
+              <a:rPr lang="ru-RU" dirty="0"/>
+              <a:t>естественных примесей̆ и продуктов коррозии, входящих в состав теплоносителя первого контура </a:t>
+            </a:r>
+          </a:p>
+        </p:txBody>
+      </p:sp>
+    </p:spTree>
+    <p:extLst>
+      <p:ext uri="{BB962C8B-B14F-4D97-AF65-F5344CB8AC3E}">
+        <p14:creationId xmlns:p14="http://schemas.microsoft.com/office/powerpoint/2010/main" val="2780822590"/>
+      </p:ext>
+    </p:extLst>
+  </p:cSld>
+  <p:clrMapOvr>
+    <a:masterClrMapping/>
+  </p:clrMapOvr>
+</p:sld>
+</file>
+
+<file path=ppt/slides/slide17.xml><?xml version="1.0" encoding="utf-8"?>
+<p:sld xmlns:a="http://schemas.openxmlformats.org/drawingml/2006/main" xmlns:r="http://schemas.openxmlformats.org/officeDocument/2006/relationships" xmlns:p="http://schemas.openxmlformats.org/presentationml/2006/main">
+  <p:cSld>
+    <p:spTree>
+      <p:nvGrpSpPr>
+        <p:cNvPr id="1" name=""/>
+        <p:cNvGrpSpPr/>
+        <p:nvPr/>
+      </p:nvGrpSpPr>
+      <p:grpSpPr>
+        <a:xfrm>
+          <a:off x="0" y="0"/>
+          <a:ext cx="0" cy="0"/>
+          <a:chOff x="0" y="0"/>
+          <a:chExt cx="0" cy="0"/>
+        </a:xfrm>
+      </p:grpSpPr>
+      <p:sp>
+        <p:nvSpPr>
+          <p:cNvPr id="2" name="Заголовок 1">
+            <a:extLst>
+              <a:ext uri="{FF2B5EF4-FFF2-40B4-BE49-F238E27FC236}">
+                <a16:creationId xmlns:a16="http://schemas.microsoft.com/office/drawing/2014/main" id="{B677E4F4-DFDF-F049-BEC2-0D1FD8B335DA}"/>
+              </a:ext>
+            </a:extLst>
+          </p:cNvPr>
+          <p:cNvSpPr>
+            <a:spLocks noGrp="1"/>
+          </p:cNvSpPr>
+          <p:nvPr>
+            <p:ph type="title"/>
+          </p:nvPr>
+        </p:nvSpPr>
+        <p:spPr>
+          <a:xfrm>
+            <a:off x="2115398" y="365125"/>
+            <a:ext cx="9238401" cy="1325563"/>
+          </a:xfrm>
+        </p:spPr>
+        <p:txBody>
+          <a:bodyPr>
+            <a:normAutofit/>
+          </a:bodyPr>
+          <a:lstStyle/>
+          <a:p>
+            <a:pPr algn="ctr"/>
+            <a:r>
+              <a:rPr lang="ru-RU" sz="3600" b="1" dirty="0"/>
+              <a:t>Облучение естественных примесей теплоносителя и продуктов коррозии </a:t>
+            </a:r>
+            <a:endParaRPr lang="ru-RU" sz="3600" dirty="0"/>
+          </a:p>
+        </p:txBody>
+      </p:sp>
+      <p:sp>
+        <p:nvSpPr>
+          <p:cNvPr id="4" name="Номер слайда 3">
+            <a:extLst>
+              <a:ext uri="{FF2B5EF4-FFF2-40B4-BE49-F238E27FC236}">
+                <a16:creationId xmlns:a16="http://schemas.microsoft.com/office/drawing/2014/main" id="{D796AB4C-7241-0340-B6BD-12D360AD5B44}"/>
+              </a:ext>
+            </a:extLst>
+          </p:cNvPr>
+          <p:cNvSpPr>
+            <a:spLocks noGrp="1"/>
+          </p:cNvSpPr>
+          <p:nvPr>
+            <p:ph type="sldNum" sz="quarter" idx="12"/>
+          </p:nvPr>
+        </p:nvSpPr>
+        <p:spPr/>
+        <p:txBody>
+          <a:bodyPr/>
+          <a:lstStyle/>
+          <a:p>
+            <a:fld id="{BCF1BF90-A525-E342-BC2E-E63C1FF229A5}" type="slidenum">
+              <a:rPr lang="ru-RU" smtClean="0"/>
+              <a:t>17</a:t>
+            </a:fld>
+            <a:endParaRPr lang="ru-RU"/>
+          </a:p>
+        </p:txBody>
+      </p:sp>
+      <p:pic>
+        <p:nvPicPr>
+          <p:cNvPr id="5" name="Рисунок 4">
+            <a:extLst>
+              <a:ext uri="{FF2B5EF4-FFF2-40B4-BE49-F238E27FC236}">
+                <a16:creationId xmlns:a16="http://schemas.microsoft.com/office/drawing/2014/main" id="{E46ACD78-454B-6447-9B39-4A02E7AE42A9}"/>
+              </a:ext>
+            </a:extLst>
+          </p:cNvPr>
+          <p:cNvPicPr>
+            <a:picLocks noChangeAspect="1"/>
+          </p:cNvPicPr>
+          <p:nvPr/>
+        </p:nvPicPr>
+        <p:blipFill>
+          <a:blip r:embed="rId2" cstate="print">
+            <a:extLst>
+              <a:ext uri="{28A0092B-C50C-407E-A947-70E740481C1C}">
+                <a14:useLocalDpi xmlns:a14="http://schemas.microsoft.com/office/drawing/2010/main" val="0"/>
+              </a:ext>
+            </a:extLst>
+          </a:blip>
+          <a:stretch>
+            <a:fillRect/>
+          </a:stretch>
+        </p:blipFill>
+        <p:spPr>
+          <a:xfrm>
+            <a:off x="54000" y="104400"/>
+            <a:ext cx="2061399" cy="2023150"/>
+          </a:xfrm>
+          <a:prstGeom prst="rect">
+            <a:avLst/>
+          </a:prstGeom>
+        </p:spPr>
+      </p:pic>
+      <p:pic>
+        <p:nvPicPr>
+          <p:cNvPr id="8" name="Рисунок 7">
+            <a:extLst>
+              <a:ext uri="{FF2B5EF4-FFF2-40B4-BE49-F238E27FC236}">
+                <a16:creationId xmlns:a16="http://schemas.microsoft.com/office/drawing/2014/main" id="{92F847FD-C42E-8047-A98C-282C8443486E}"/>
+              </a:ext>
+            </a:extLst>
+          </p:cNvPr>
+          <p:cNvPicPr>
+            <a:picLocks noChangeAspect="1"/>
+          </p:cNvPicPr>
+          <p:nvPr/>
+        </p:nvPicPr>
+        <p:blipFill>
+          <a:blip r:embed="rId3"/>
+          <a:stretch>
+            <a:fillRect/>
+          </a:stretch>
+        </p:blipFill>
+        <p:spPr>
+          <a:xfrm>
+            <a:off x="4341959" y="2527487"/>
+            <a:ext cx="4785273" cy="1338926"/>
+          </a:xfrm>
+          <a:prstGeom prst="rect">
+            <a:avLst/>
+          </a:prstGeom>
+        </p:spPr>
+      </p:pic>
+      <p:sp>
+        <p:nvSpPr>
+          <p:cNvPr id="9" name="TextBox 8">
+            <a:extLst>
+              <a:ext uri="{FF2B5EF4-FFF2-40B4-BE49-F238E27FC236}">
+                <a16:creationId xmlns:a16="http://schemas.microsoft.com/office/drawing/2014/main" id="{59615065-E369-C142-B5FC-27664B779ABC}"/>
+              </a:ext>
+            </a:extLst>
+          </p:cNvPr>
+          <p:cNvSpPr txBox="1"/>
+          <p:nvPr/>
+        </p:nvSpPr>
+        <p:spPr>
+          <a:xfrm>
+            <a:off x="4297080" y="2006323"/>
+            <a:ext cx="4875053" cy="369332"/>
+          </a:xfrm>
+          <a:prstGeom prst="rect">
+            <a:avLst/>
+          </a:prstGeom>
+          <a:noFill/>
+        </p:spPr>
+        <p:txBody>
+          <a:bodyPr wrap="none" rtlCol="0">
+            <a:spAutoFit/>
+          </a:bodyPr>
+          <a:lstStyle/>
+          <a:p>
+            <a:pPr algn="ctr"/>
+            <a:r>
+              <a:rPr lang="ru-RU" dirty="0"/>
+              <a:t>Разбиение энергетической области на 2 группы</a:t>
+            </a:r>
+          </a:p>
+        </p:txBody>
+      </p:sp>
+      <p:pic>
+        <p:nvPicPr>
+          <p:cNvPr id="11" name="Рисунок 10">
+            <a:extLst>
+              <a:ext uri="{FF2B5EF4-FFF2-40B4-BE49-F238E27FC236}">
+                <a16:creationId xmlns:a16="http://schemas.microsoft.com/office/drawing/2014/main" id="{779BFBEB-8E9F-004F-9329-60C11F450062}"/>
+              </a:ext>
+            </a:extLst>
+          </p:cNvPr>
+          <p:cNvPicPr>
+            <a:picLocks noChangeAspect="1"/>
+          </p:cNvPicPr>
+          <p:nvPr/>
+        </p:nvPicPr>
+        <p:blipFill>
+          <a:blip r:embed="rId4"/>
+          <a:stretch>
+            <a:fillRect/>
+          </a:stretch>
+        </p:blipFill>
+        <p:spPr>
+          <a:xfrm>
+            <a:off x="2368464" y="4864009"/>
+            <a:ext cx="8732266" cy="1185326"/>
+          </a:xfrm>
+          <a:prstGeom prst="rect">
+            <a:avLst/>
+          </a:prstGeom>
+        </p:spPr>
+      </p:pic>
+      <p:sp>
+        <p:nvSpPr>
+          <p:cNvPr id="12" name="TextBox 11">
+            <a:extLst>
+              <a:ext uri="{FF2B5EF4-FFF2-40B4-BE49-F238E27FC236}">
+                <a16:creationId xmlns:a16="http://schemas.microsoft.com/office/drawing/2014/main" id="{E1B86349-590F-CC4A-82F4-7D91AFDCC2F5}"/>
+              </a:ext>
+            </a:extLst>
+          </p:cNvPr>
+          <p:cNvSpPr txBox="1"/>
+          <p:nvPr/>
+        </p:nvSpPr>
+        <p:spPr>
+          <a:xfrm>
+            <a:off x="1227320" y="4173428"/>
+            <a:ext cx="11014554" cy="646331"/>
+          </a:xfrm>
+          <a:prstGeom prst="rect">
+            <a:avLst/>
+          </a:prstGeom>
+          <a:noFill/>
+        </p:spPr>
+        <p:txBody>
+          <a:bodyPr wrap="none" rtlCol="0">
+            <a:spAutoFit/>
+          </a:bodyPr>
+          <a:lstStyle/>
+          <a:p>
+            <a:pPr algn="ctr"/>
+            <a:r>
+              <a:rPr lang="ru-RU" dirty="0"/>
+              <a:t>Конечная формула скорости изменения концентрации </a:t>
+            </a:r>
+            <a:r>
+              <a:rPr lang="en-US" dirty="0" err="1"/>
+              <a:t>i</a:t>
+            </a:r>
+            <a:r>
+              <a:rPr lang="en-US" dirty="0"/>
+              <a:t>-</a:t>
+            </a:r>
+            <a:r>
+              <a:rPr lang="ru-RU" dirty="0"/>
+              <a:t>ого радионуклида</a:t>
+            </a:r>
+            <a:r>
+              <a:rPr lang="en-US" dirty="0"/>
+              <a:t>, </a:t>
+            </a:r>
+            <a:r>
+              <a:rPr lang="ru-RU" dirty="0"/>
+              <a:t>образующегося в результате </a:t>
+            </a:r>
+          </a:p>
+          <a:p>
+            <a:pPr algn="ctr"/>
+            <a:r>
+              <a:rPr lang="ru-RU" dirty="0"/>
+              <a:t>облучения естественных примесей̆ и продуктов коррозии, входящих в состав теплоносителя первого контура </a:t>
+            </a:r>
+          </a:p>
+        </p:txBody>
+      </p:sp>
+    </p:spTree>
+    <p:extLst>
+      <p:ext uri="{BB962C8B-B14F-4D97-AF65-F5344CB8AC3E}">
+        <p14:creationId xmlns:p14="http://schemas.microsoft.com/office/powerpoint/2010/main" val="403504716"/>
       </p:ext>
     </p:extLst>
   </p:cSld>
@@ -9430,8 +9992,8 @@
           </a:prstGeom>
         </p:spPr>
       </p:pic>
-      <mc:AlternateContent xmlns:mc="http://schemas.openxmlformats.org/markup-compatibility/2006">
-        <mc:Choice xmlns:a14="http://schemas.microsoft.com/office/drawing/2010/main" Requires="a14">
+      <mc:AlternateContent xmlns:mc="http://schemas.openxmlformats.org/markup-compatibility/2006" xmlns:a14="http://schemas.microsoft.com/office/drawing/2010/main">
+        <mc:Choice Requires="a14">
           <p:graphicFrame>
             <p:nvGraphicFramePr>
               <p:cNvPr id="5" name="Таблица 4">
@@ -9674,13 +10236,7 @@
                                       <a:rPr lang="en-US" b="0" i="1" smtClean="0">
                                         <a:latin typeface="Cambria Math" panose="02040503050406030204" pitchFamily="18" charset="0"/>
                                       </a:rPr>
-                                      <m:t>13</m:t>
-                                    </m:r>
-                                    <m:r>
-                                      <a:rPr lang="en-US" b="0" i="1" smtClean="0">
-                                        <a:latin typeface="Cambria Math" panose="02040503050406030204" pitchFamily="18" charset="0"/>
-                                      </a:rPr>
-                                      <m:t>2</m:t>
+                                      <m:t>132</m:t>
                                     </m:r>
                                   </m:sup>
                                   <m:e>
@@ -9862,13 +10418,7 @@
                                       <a:rPr lang="en-US" b="0" i="1" smtClean="0">
                                         <a:latin typeface="Cambria Math" panose="02040503050406030204" pitchFamily="18" charset="0"/>
                                       </a:rPr>
-                                      <m:t>13</m:t>
-                                    </m:r>
-                                    <m:r>
-                                      <a:rPr lang="en-US" b="0" i="1" smtClean="0">
-                                        <a:latin typeface="Cambria Math" panose="02040503050406030204" pitchFamily="18" charset="0"/>
-                                      </a:rPr>
-                                      <m:t>4</m:t>
+                                      <m:t>134</m:t>
                                     </m:r>
                                   </m:sup>
                                   <m:e>
@@ -9959,13 +10509,7 @@
                                       <a:rPr lang="en-US" b="0" i="1" smtClean="0">
                                         <a:latin typeface="Cambria Math" panose="02040503050406030204" pitchFamily="18" charset="0"/>
                                       </a:rPr>
-                                      <m:t>13</m:t>
-                                    </m:r>
-                                    <m:r>
-                                      <a:rPr lang="en-US" b="0" i="1" smtClean="0">
-                                        <a:latin typeface="Cambria Math" panose="02040503050406030204" pitchFamily="18" charset="0"/>
-                                      </a:rPr>
-                                      <m:t>5</m:t>
+                                      <m:t>135</m:t>
                                     </m:r>
                                   </m:sup>
                                   <m:e>
@@ -10018,7 +10562,7 @@
             </a:graphic>
           </p:graphicFrame>
         </mc:Choice>
-        <mc:Fallback>
+        <mc:Fallback xmlns="">
           <p:graphicFrame>
             <p:nvGraphicFramePr>
               <p:cNvPr id="5" name="Таблица 4">

</xml_diff>

<commit_message>
First final presentation version
</commit_message>
<xml_diff>
--- a/practice/presentation/practice.pptx
+++ b/practice/presentation/practice.pptx
@@ -5,7 +5,7 @@
     <p:sldMasterId id="2147483648" r:id="rId1"/>
   </p:sldMasterIdLst>
   <p:notesMasterIdLst>
-    <p:notesMasterId r:id="rId22"/>
+    <p:notesMasterId r:id="rId24"/>
   </p:notesMasterIdLst>
   <p:sldIdLst>
     <p:sldId id="256" r:id="rId2"/>
@@ -28,6 +28,8 @@
     <p:sldId id="273" r:id="rId19"/>
     <p:sldId id="274" r:id="rId20"/>
     <p:sldId id="275" r:id="rId21"/>
+    <p:sldId id="276" r:id="rId22"/>
+    <p:sldId id="277" r:id="rId23"/>
   </p:sldIdLst>
   <p:sldSz cx="12192000" cy="6858000"/>
   <p:notesSz cx="6858000" cy="9144000"/>
@@ -216,7 +218,7 @@
           <a:p>
             <a:fld id="{C1BE233C-821B-974A-A52A-CD29D4926BDE}" type="datetimeFigureOut">
               <a:rPr lang="ru-RU" smtClean="0"/>
-              <a:t>09.10.2019</a:t>
+              <a:t>10.10.2019</a:t>
             </a:fld>
             <a:endParaRPr lang="ru-RU"/>
           </a:p>
@@ -605,7 +607,7 @@
           <a:p>
             <a:fld id="{2E132DE3-3A85-534B-9651-69C158026FC5}" type="datetime1">
               <a:rPr lang="ru-RU" smtClean="0"/>
-              <a:t>09.10.2019</a:t>
+              <a:t>10.10.2019</a:t>
             </a:fld>
             <a:endParaRPr lang="ru-RU"/>
           </a:p>
@@ -778,7 +780,7 @@
           <a:p>
             <a:fld id="{E98D4417-AD14-C849-8B7E-6A6980018476}" type="datetime1">
               <a:rPr lang="ru-RU" smtClean="0"/>
-              <a:t>09.10.2019</a:t>
+              <a:t>10.10.2019</a:t>
             </a:fld>
             <a:endParaRPr lang="ru-RU"/>
           </a:p>
@@ -961,7 +963,7 @@
           <a:p>
             <a:fld id="{BFE9C9B0-2AEE-9F4C-BB3E-9B30570F0C19}" type="datetime1">
               <a:rPr lang="ru-RU" smtClean="0"/>
-              <a:t>09.10.2019</a:t>
+              <a:t>10.10.2019</a:t>
             </a:fld>
             <a:endParaRPr lang="ru-RU"/>
           </a:p>
@@ -1134,7 +1136,7 @@
           <a:p>
             <a:fld id="{90A65726-7F6C-4041-868B-244862CB30F1}" type="datetime1">
               <a:rPr lang="ru-RU" smtClean="0"/>
-              <a:t>09.10.2019</a:t>
+              <a:t>10.10.2019</a:t>
             </a:fld>
             <a:endParaRPr lang="ru-RU"/>
           </a:p>
@@ -1412,7 +1414,7 @@
           <a:p>
             <a:fld id="{1184FBBA-8785-DC4A-A93C-FC4CD6ADE36B}" type="datetime1">
               <a:rPr lang="ru-RU" smtClean="0"/>
-              <a:t>09.10.2019</a:t>
+              <a:t>10.10.2019</a:t>
             </a:fld>
             <a:endParaRPr lang="ru-RU"/>
           </a:p>
@@ -1627,7 +1629,7 @@
           <a:p>
             <a:fld id="{835EE99D-4BDE-194F-BC3E-9B7D3C76FEFA}" type="datetime1">
               <a:rPr lang="ru-RU" smtClean="0"/>
-              <a:t>09.10.2019</a:t>
+              <a:t>10.10.2019</a:t>
             </a:fld>
             <a:endParaRPr lang="ru-RU"/>
           </a:p>
@@ -1995,7 +1997,7 @@
           <a:p>
             <a:fld id="{5EFCAC52-90F7-1E4D-9FD8-37A22881766A}" type="datetime1">
               <a:rPr lang="ru-RU" smtClean="0"/>
-              <a:t>09.10.2019</a:t>
+              <a:t>10.10.2019</a:t>
             </a:fld>
             <a:endParaRPr lang="ru-RU"/>
           </a:p>
@@ -2136,7 +2138,7 @@
           <a:p>
             <a:fld id="{6E5BBC5D-D354-1A48-A947-FD53F892AC62}" type="datetime1">
               <a:rPr lang="ru-RU" smtClean="0"/>
-              <a:t>09.10.2019</a:t>
+              <a:t>10.10.2019</a:t>
             </a:fld>
             <a:endParaRPr lang="ru-RU"/>
           </a:p>
@@ -2249,7 +2251,7 @@
           <a:p>
             <a:fld id="{55845D2C-3AD4-454E-890D-8819E7F9CC89}" type="datetime1">
               <a:rPr lang="ru-RU" smtClean="0"/>
-              <a:t>09.10.2019</a:t>
+              <a:t>10.10.2019</a:t>
             </a:fld>
             <a:endParaRPr lang="ru-RU"/>
           </a:p>
@@ -2538,7 +2540,7 @@
           <a:p>
             <a:fld id="{32AD0C68-1C81-6148-BA97-FE9643273DE0}" type="datetime1">
               <a:rPr lang="ru-RU" smtClean="0"/>
-              <a:t>09.10.2019</a:t>
+              <a:t>10.10.2019</a:t>
             </a:fld>
             <a:endParaRPr lang="ru-RU"/>
           </a:p>
@@ -2829,7 +2831,7 @@
           <a:p>
             <a:fld id="{ED5B4937-9B2A-3B49-A229-92C09A155F1F}" type="datetime1">
               <a:rPr lang="ru-RU" smtClean="0"/>
-              <a:t>09.10.2019</a:t>
+              <a:t>10.10.2019</a:t>
             </a:fld>
             <a:endParaRPr lang="ru-RU"/>
           </a:p>
@@ -3045,7 +3047,7 @@
           <a:p>
             <a:fld id="{D1A570F3-012D-6640-87D8-43D8365EB611}" type="datetime1">
               <a:rPr lang="ru-RU" smtClean="0"/>
-              <a:t>09.10.2019</a:t>
+              <a:t>10.10.2019</a:t>
             </a:fld>
             <a:endParaRPr lang="ru-RU"/>
           </a:p>
@@ -7386,7 +7388,9 @@
           </a:xfrm>
         </p:spPr>
         <p:txBody>
-          <a:bodyPr/>
+          <a:bodyPr>
+            <a:normAutofit fontScale="92500" lnSpcReduction="10000"/>
+          </a:bodyPr>
           <a:lstStyle/>
           <a:p>
             <a:r>
@@ -7399,6 +7403,26 @@
               <a:rPr lang="ru-RU" dirty="0"/>
               <a:t>Параметры уравнения явно или неявно зависят от типа и свойств местности</a:t>
             </a:r>
+            <a:endParaRPr lang="en-US" dirty="0"/>
+          </a:p>
+          <a:p>
+            <a:r>
+              <a:rPr lang="ru-RU" dirty="0"/>
+              <a:t>При разработке модуля используются средства языка программирования </a:t>
+            </a:r>
+            <a:r>
+              <a:rPr lang="en-US" dirty="0"/>
+              <a:t>Python</a:t>
+            </a:r>
+            <a:r>
+              <a:rPr lang="ru-RU" dirty="0"/>
+              <a:t> и библиотеки </a:t>
+            </a:r>
+            <a:r>
+              <a:rPr lang="en-US" dirty="0"/>
+              <a:t>Pillow</a:t>
+            </a:r>
+            <a:endParaRPr lang="ru-RU" dirty="0"/>
           </a:p>
         </p:txBody>
       </p:sp>
@@ -8417,15 +8441,43 @@
         </p:nvSpPr>
         <p:spPr>
           <a:xfrm>
-            <a:off x="2115397" y="2127550"/>
-            <a:ext cx="9238402" cy="2356452"/>
+            <a:off x="2115397" y="2127549"/>
+            <a:ext cx="9238402" cy="4315291"/>
           </a:xfrm>
         </p:spPr>
         <p:txBody>
           <a:bodyPr/>
           <a:lstStyle/>
           <a:p>
-            <a:endParaRPr lang="ru-RU" dirty="0"/>
+            <a:r>
+              <a:rPr lang="ru-RU" dirty="0"/>
+              <a:t>Решение уравнения адвекции – диффузии численным методом конечных элементов</a:t>
+            </a:r>
+          </a:p>
+          <a:p>
+            <a:r>
+              <a:rPr lang="ru-RU" dirty="0"/>
+              <a:t>Необходимость создания расчетной сетки - трудоемкий процесс</a:t>
+            </a:r>
+          </a:p>
+          <a:p>
+            <a:r>
+              <a:rPr lang="ru-RU" dirty="0"/>
+              <a:t>Использование программы </a:t>
+            </a:r>
+            <a:r>
+              <a:rPr lang="en-US" dirty="0" err="1"/>
+              <a:t>gmsh</a:t>
+            </a:r>
+            <a:r>
+              <a:rPr lang="ru-RU" dirty="0"/>
+              <a:t> совместно с библиотекой </a:t>
+            </a:r>
+            <a:r>
+              <a:rPr lang="en-US" dirty="0" err="1"/>
+              <a:t>pygmsh</a:t>
+            </a:r>
+            <a:endParaRPr lang="en-US" dirty="0"/>
           </a:p>
         </p:txBody>
       </p:sp>
@@ -8433,6 +8485,374 @@
     <p:extLst>
       <p:ext uri="{BB962C8B-B14F-4D97-AF65-F5344CB8AC3E}">
         <p14:creationId xmlns:p14="http://schemas.microsoft.com/office/powerpoint/2010/main" val="4018529508"/>
+      </p:ext>
+    </p:extLst>
+  </p:cSld>
+  <p:clrMapOvr>
+    <a:masterClrMapping/>
+  </p:clrMapOvr>
+</p:sld>
+</file>
+
+<file path=ppt/slides/slide21.xml><?xml version="1.0" encoding="utf-8"?>
+<p:sld xmlns:a="http://schemas.openxmlformats.org/drawingml/2006/main" xmlns:r="http://schemas.openxmlformats.org/officeDocument/2006/relationships" xmlns:p="http://schemas.openxmlformats.org/presentationml/2006/main">
+  <p:cSld>
+    <p:spTree>
+      <p:nvGrpSpPr>
+        <p:cNvPr id="1" name=""/>
+        <p:cNvGrpSpPr/>
+        <p:nvPr/>
+      </p:nvGrpSpPr>
+      <p:grpSpPr>
+        <a:xfrm>
+          <a:off x="0" y="0"/>
+          <a:ext cx="0" cy="0"/>
+          <a:chOff x="0" y="0"/>
+          <a:chExt cx="0" cy="0"/>
+        </a:xfrm>
+      </p:grpSpPr>
+      <p:sp>
+        <p:nvSpPr>
+          <p:cNvPr id="2" name="Заголовок 1">
+            <a:extLst>
+              <a:ext uri="{FF2B5EF4-FFF2-40B4-BE49-F238E27FC236}">
+                <a16:creationId xmlns:a16="http://schemas.microsoft.com/office/drawing/2014/main" id="{3D8672B5-161D-BF44-8570-8CD167F9B39B}"/>
+              </a:ext>
+            </a:extLst>
+          </p:cNvPr>
+          <p:cNvSpPr>
+            <a:spLocks noGrp="1"/>
+          </p:cNvSpPr>
+          <p:nvPr>
+            <p:ph type="title"/>
+          </p:nvPr>
+        </p:nvSpPr>
+        <p:spPr>
+          <a:xfrm>
+            <a:off x="2115398" y="365125"/>
+            <a:ext cx="9238401" cy="1325563"/>
+          </a:xfrm>
+        </p:spPr>
+        <p:txBody>
+          <a:bodyPr>
+            <a:normAutofit/>
+          </a:bodyPr>
+          <a:lstStyle/>
+          <a:p>
+            <a:pPr algn="ctr"/>
+            <a:r>
+              <a:rPr lang="ru-RU" sz="3600" b="1" dirty="0"/>
+              <a:t>Разработка расчетной сетки и аппроксимация свойств местности на её узлы</a:t>
+            </a:r>
+            <a:endParaRPr lang="ru-RU" sz="3600" dirty="0"/>
+          </a:p>
+        </p:txBody>
+      </p:sp>
+      <p:sp>
+        <p:nvSpPr>
+          <p:cNvPr id="4" name="Номер слайда 3">
+            <a:extLst>
+              <a:ext uri="{FF2B5EF4-FFF2-40B4-BE49-F238E27FC236}">
+                <a16:creationId xmlns:a16="http://schemas.microsoft.com/office/drawing/2014/main" id="{50F4ABD6-5989-2D4F-8919-B26174DD7A47}"/>
+              </a:ext>
+            </a:extLst>
+          </p:cNvPr>
+          <p:cNvSpPr>
+            <a:spLocks noGrp="1"/>
+          </p:cNvSpPr>
+          <p:nvPr>
+            <p:ph type="sldNum" sz="quarter" idx="12"/>
+          </p:nvPr>
+        </p:nvSpPr>
+        <p:spPr/>
+        <p:txBody>
+          <a:bodyPr/>
+          <a:lstStyle/>
+          <a:p>
+            <a:fld id="{BCF1BF90-A525-E342-BC2E-E63C1FF229A5}" type="slidenum">
+              <a:rPr lang="ru-RU" smtClean="0"/>
+              <a:t>21</a:t>
+            </a:fld>
+            <a:endParaRPr lang="ru-RU"/>
+          </a:p>
+        </p:txBody>
+      </p:sp>
+      <p:pic>
+        <p:nvPicPr>
+          <p:cNvPr id="5" name="Рисунок 4">
+            <a:extLst>
+              <a:ext uri="{FF2B5EF4-FFF2-40B4-BE49-F238E27FC236}">
+                <a16:creationId xmlns:a16="http://schemas.microsoft.com/office/drawing/2014/main" id="{A53DA525-690E-F64F-B6CE-AC6168894C84}"/>
+              </a:ext>
+            </a:extLst>
+          </p:cNvPr>
+          <p:cNvPicPr>
+            <a:picLocks noChangeAspect="1"/>
+          </p:cNvPicPr>
+          <p:nvPr/>
+        </p:nvPicPr>
+        <p:blipFill>
+          <a:blip r:embed="rId2" cstate="print">
+            <a:extLst>
+              <a:ext uri="{28A0092B-C50C-407E-A947-70E740481C1C}">
+                <a14:useLocalDpi xmlns:a14="http://schemas.microsoft.com/office/drawing/2010/main" val="0"/>
+              </a:ext>
+            </a:extLst>
+          </a:blip>
+          <a:stretch>
+            <a:fillRect/>
+          </a:stretch>
+        </p:blipFill>
+        <p:spPr>
+          <a:xfrm>
+            <a:off x="54000" y="104400"/>
+            <a:ext cx="2061399" cy="2023150"/>
+          </a:xfrm>
+          <a:prstGeom prst="rect">
+            <a:avLst/>
+          </a:prstGeom>
+        </p:spPr>
+      </p:pic>
+      <p:pic>
+        <p:nvPicPr>
+          <p:cNvPr id="7" name="Рисунок 6">
+            <a:extLst>
+              <a:ext uri="{FF2B5EF4-FFF2-40B4-BE49-F238E27FC236}">
+                <a16:creationId xmlns:a16="http://schemas.microsoft.com/office/drawing/2014/main" id="{CD7D0766-80E7-2445-966B-925B9A67258B}"/>
+              </a:ext>
+            </a:extLst>
+          </p:cNvPr>
+          <p:cNvPicPr>
+            <a:picLocks noChangeAspect="1"/>
+          </p:cNvPicPr>
+          <p:nvPr/>
+        </p:nvPicPr>
+        <p:blipFill>
+          <a:blip r:embed="rId3"/>
+          <a:stretch>
+            <a:fillRect/>
+          </a:stretch>
+        </p:blipFill>
+        <p:spPr>
+          <a:xfrm>
+            <a:off x="2777344" y="1951413"/>
+            <a:ext cx="7914509" cy="3595751"/>
+          </a:xfrm>
+          <a:prstGeom prst="rect">
+            <a:avLst/>
+          </a:prstGeom>
+        </p:spPr>
+      </p:pic>
+    </p:spTree>
+    <p:extLst>
+      <p:ext uri="{BB962C8B-B14F-4D97-AF65-F5344CB8AC3E}">
+        <p14:creationId xmlns:p14="http://schemas.microsoft.com/office/powerpoint/2010/main" val="759356322"/>
+      </p:ext>
+    </p:extLst>
+  </p:cSld>
+  <p:clrMapOvr>
+    <a:masterClrMapping/>
+  </p:clrMapOvr>
+</p:sld>
+</file>
+
+<file path=ppt/slides/slide22.xml><?xml version="1.0" encoding="utf-8"?>
+<p:sld xmlns:a="http://schemas.openxmlformats.org/drawingml/2006/main" xmlns:r="http://schemas.openxmlformats.org/officeDocument/2006/relationships" xmlns:p="http://schemas.openxmlformats.org/presentationml/2006/main">
+  <p:cSld>
+    <p:spTree>
+      <p:nvGrpSpPr>
+        <p:cNvPr id="1" name=""/>
+        <p:cNvGrpSpPr/>
+        <p:nvPr/>
+      </p:nvGrpSpPr>
+      <p:grpSpPr>
+        <a:xfrm>
+          <a:off x="0" y="0"/>
+          <a:ext cx="0" cy="0"/>
+          <a:chOff x="0" y="0"/>
+          <a:chExt cx="0" cy="0"/>
+        </a:xfrm>
+      </p:grpSpPr>
+      <p:sp>
+        <p:nvSpPr>
+          <p:cNvPr id="2" name="Заголовок 1">
+            <a:extLst>
+              <a:ext uri="{FF2B5EF4-FFF2-40B4-BE49-F238E27FC236}">
+                <a16:creationId xmlns:a16="http://schemas.microsoft.com/office/drawing/2014/main" id="{6C380BF9-ABFE-6E4F-B4F7-78388B9A7B2D}"/>
+              </a:ext>
+            </a:extLst>
+          </p:cNvPr>
+          <p:cNvSpPr>
+            <a:spLocks noGrp="1"/>
+          </p:cNvSpPr>
+          <p:nvPr>
+            <p:ph type="title"/>
+          </p:nvPr>
+        </p:nvSpPr>
+        <p:spPr>
+          <a:xfrm>
+            <a:off x="2115398" y="365125"/>
+            <a:ext cx="9238401" cy="1325563"/>
+          </a:xfrm>
+        </p:spPr>
+        <p:txBody>
+          <a:bodyPr>
+            <a:normAutofit/>
+          </a:bodyPr>
+          <a:lstStyle/>
+          <a:p>
+            <a:pPr algn="ctr"/>
+            <a:r>
+              <a:rPr lang="ru-RU" sz="3600" b="1" dirty="0"/>
+              <a:t>Итоги производственной практики</a:t>
+            </a:r>
+          </a:p>
+        </p:txBody>
+      </p:sp>
+      <p:sp>
+        <p:nvSpPr>
+          <p:cNvPr id="3" name="Объект 2">
+            <a:extLst>
+              <a:ext uri="{FF2B5EF4-FFF2-40B4-BE49-F238E27FC236}">
+                <a16:creationId xmlns:a16="http://schemas.microsoft.com/office/drawing/2014/main" id="{2629BBAB-3FF0-2647-8121-005B95C897BB}"/>
+              </a:ext>
+            </a:extLst>
+          </p:cNvPr>
+          <p:cNvSpPr>
+            <a:spLocks noGrp="1"/>
+          </p:cNvSpPr>
+          <p:nvPr>
+            <p:ph idx="1"/>
+          </p:nvPr>
+        </p:nvSpPr>
+        <p:spPr>
+          <a:xfrm>
+            <a:off x="2115398" y="1825625"/>
+            <a:ext cx="9238402" cy="4351338"/>
+          </a:xfrm>
+        </p:spPr>
+        <p:txBody>
+          <a:bodyPr>
+            <a:normAutofit lnSpcReduction="10000"/>
+          </a:bodyPr>
+          <a:lstStyle/>
+          <a:p>
+            <a:r>
+              <a:rPr lang="ru-RU" dirty="0"/>
+              <a:t>Изучен принцип работы АСКРО</a:t>
+            </a:r>
+          </a:p>
+          <a:p>
+            <a:r>
+              <a:rPr lang="ru-RU" dirty="0"/>
+              <a:t>Изучена литература</a:t>
+            </a:r>
+            <a:r>
+              <a:rPr lang="en-US" dirty="0"/>
+              <a:t>, </a:t>
+            </a:r>
+            <a:r>
+              <a:rPr lang="ru-RU" dirty="0"/>
+              <a:t>посвященная активации теплоносителя первого контура РУ</a:t>
+            </a:r>
+          </a:p>
+          <a:p>
+            <a:r>
+              <a:rPr lang="ru-RU" dirty="0"/>
+              <a:t>Разработана модель активации теплоносителя первого контура</a:t>
+            </a:r>
+          </a:p>
+          <a:p>
+            <a:r>
+              <a:rPr lang="ru-RU" dirty="0"/>
+              <a:t>Разработаны модуль анализа свойств местности по данным топологических карт</a:t>
+            </a:r>
+            <a:r>
+              <a:rPr lang="en-US" dirty="0"/>
+              <a:t>, </a:t>
+            </a:r>
+            <a:r>
+              <a:rPr lang="ru-RU" dirty="0"/>
+              <a:t>модуль генерации расчетной сетки и аппроксимации свойств местности на её узлы</a:t>
+            </a:r>
+          </a:p>
+          <a:p>
+            <a:r>
+              <a:rPr lang="ru-RU" dirty="0"/>
+              <a:t>Создан задел для выполнения дипломного проекта</a:t>
+            </a:r>
+          </a:p>
+        </p:txBody>
+      </p:sp>
+      <p:sp>
+        <p:nvSpPr>
+          <p:cNvPr id="4" name="Номер слайда 3">
+            <a:extLst>
+              <a:ext uri="{FF2B5EF4-FFF2-40B4-BE49-F238E27FC236}">
+                <a16:creationId xmlns:a16="http://schemas.microsoft.com/office/drawing/2014/main" id="{9289582D-D166-E049-9F24-0B6FC1895138}"/>
+              </a:ext>
+            </a:extLst>
+          </p:cNvPr>
+          <p:cNvSpPr>
+            <a:spLocks noGrp="1"/>
+          </p:cNvSpPr>
+          <p:nvPr>
+            <p:ph type="sldNum" sz="quarter" idx="12"/>
+          </p:nvPr>
+        </p:nvSpPr>
+        <p:spPr/>
+        <p:txBody>
+          <a:bodyPr/>
+          <a:lstStyle/>
+          <a:p>
+            <a:fld id="{BCF1BF90-A525-E342-BC2E-E63C1FF229A5}" type="slidenum">
+              <a:rPr lang="ru-RU" smtClean="0"/>
+              <a:t>22</a:t>
+            </a:fld>
+            <a:endParaRPr lang="ru-RU"/>
+          </a:p>
+        </p:txBody>
+      </p:sp>
+      <p:pic>
+        <p:nvPicPr>
+          <p:cNvPr id="5" name="Рисунок 4">
+            <a:extLst>
+              <a:ext uri="{FF2B5EF4-FFF2-40B4-BE49-F238E27FC236}">
+                <a16:creationId xmlns:a16="http://schemas.microsoft.com/office/drawing/2014/main" id="{0573E790-7693-E141-92BD-A3124893FBC2}"/>
+              </a:ext>
+            </a:extLst>
+          </p:cNvPr>
+          <p:cNvPicPr>
+            <a:picLocks noChangeAspect="1"/>
+          </p:cNvPicPr>
+          <p:nvPr/>
+        </p:nvPicPr>
+        <p:blipFill>
+          <a:blip r:embed="rId2" cstate="print">
+            <a:extLst>
+              <a:ext uri="{28A0092B-C50C-407E-A947-70E740481C1C}">
+                <a14:useLocalDpi xmlns:a14="http://schemas.microsoft.com/office/drawing/2010/main" val="0"/>
+              </a:ext>
+            </a:extLst>
+          </a:blip>
+          <a:stretch>
+            <a:fillRect/>
+          </a:stretch>
+        </p:blipFill>
+        <p:spPr>
+          <a:xfrm>
+            <a:off x="54000" y="104400"/>
+            <a:ext cx="2061399" cy="2023150"/>
+          </a:xfrm>
+          <a:prstGeom prst="rect">
+            <a:avLst/>
+          </a:prstGeom>
+        </p:spPr>
+      </p:pic>
+    </p:spTree>
+    <p:extLst>
+      <p:ext uri="{BB962C8B-B14F-4D97-AF65-F5344CB8AC3E}">
+        <p14:creationId xmlns:p14="http://schemas.microsoft.com/office/powerpoint/2010/main" val="824166988"/>
       </p:ext>
     </p:extLst>
   </p:cSld>

</xml_diff>

<commit_message>
Added final practice report
</commit_message>
<xml_diff>
--- a/practice/presentation/practice.pptx
+++ b/practice/presentation/practice.pptx
@@ -218,7 +218,7 @@
           <a:p>
             <a:fld id="{C1BE233C-821B-974A-A52A-CD29D4926BDE}" type="datetimeFigureOut">
               <a:rPr lang="ru-RU" smtClean="0"/>
-              <a:t>10.10.2019</a:t>
+              <a:t>11.10.2019</a:t>
             </a:fld>
             <a:endParaRPr lang="ru-RU"/>
           </a:p>
@@ -607,7 +607,7 @@
           <a:p>
             <a:fld id="{2E132DE3-3A85-534B-9651-69C158026FC5}" type="datetime1">
               <a:rPr lang="ru-RU" smtClean="0"/>
-              <a:t>10.10.2019</a:t>
+              <a:t>11.10.2019</a:t>
             </a:fld>
             <a:endParaRPr lang="ru-RU"/>
           </a:p>
@@ -780,7 +780,7 @@
           <a:p>
             <a:fld id="{E98D4417-AD14-C849-8B7E-6A6980018476}" type="datetime1">
               <a:rPr lang="ru-RU" smtClean="0"/>
-              <a:t>10.10.2019</a:t>
+              <a:t>11.10.2019</a:t>
             </a:fld>
             <a:endParaRPr lang="ru-RU"/>
           </a:p>
@@ -963,7 +963,7 @@
           <a:p>
             <a:fld id="{BFE9C9B0-2AEE-9F4C-BB3E-9B30570F0C19}" type="datetime1">
               <a:rPr lang="ru-RU" smtClean="0"/>
-              <a:t>10.10.2019</a:t>
+              <a:t>11.10.2019</a:t>
             </a:fld>
             <a:endParaRPr lang="ru-RU"/>
           </a:p>
@@ -1136,7 +1136,7 @@
           <a:p>
             <a:fld id="{90A65726-7F6C-4041-868B-244862CB30F1}" type="datetime1">
               <a:rPr lang="ru-RU" smtClean="0"/>
-              <a:t>10.10.2019</a:t>
+              <a:t>11.10.2019</a:t>
             </a:fld>
             <a:endParaRPr lang="ru-RU"/>
           </a:p>
@@ -1414,7 +1414,7 @@
           <a:p>
             <a:fld id="{1184FBBA-8785-DC4A-A93C-FC4CD6ADE36B}" type="datetime1">
               <a:rPr lang="ru-RU" smtClean="0"/>
-              <a:t>10.10.2019</a:t>
+              <a:t>11.10.2019</a:t>
             </a:fld>
             <a:endParaRPr lang="ru-RU"/>
           </a:p>
@@ -1629,7 +1629,7 @@
           <a:p>
             <a:fld id="{835EE99D-4BDE-194F-BC3E-9B7D3C76FEFA}" type="datetime1">
               <a:rPr lang="ru-RU" smtClean="0"/>
-              <a:t>10.10.2019</a:t>
+              <a:t>11.10.2019</a:t>
             </a:fld>
             <a:endParaRPr lang="ru-RU"/>
           </a:p>
@@ -1997,7 +1997,7 @@
           <a:p>
             <a:fld id="{5EFCAC52-90F7-1E4D-9FD8-37A22881766A}" type="datetime1">
               <a:rPr lang="ru-RU" smtClean="0"/>
-              <a:t>10.10.2019</a:t>
+              <a:t>11.10.2019</a:t>
             </a:fld>
             <a:endParaRPr lang="ru-RU"/>
           </a:p>
@@ -2138,7 +2138,7 @@
           <a:p>
             <a:fld id="{6E5BBC5D-D354-1A48-A947-FD53F892AC62}" type="datetime1">
               <a:rPr lang="ru-RU" smtClean="0"/>
-              <a:t>10.10.2019</a:t>
+              <a:t>11.10.2019</a:t>
             </a:fld>
             <a:endParaRPr lang="ru-RU"/>
           </a:p>
@@ -2251,7 +2251,7 @@
           <a:p>
             <a:fld id="{55845D2C-3AD4-454E-890D-8819E7F9CC89}" type="datetime1">
               <a:rPr lang="ru-RU" smtClean="0"/>
-              <a:t>10.10.2019</a:t>
+              <a:t>11.10.2019</a:t>
             </a:fld>
             <a:endParaRPr lang="ru-RU"/>
           </a:p>
@@ -2540,7 +2540,7 @@
           <a:p>
             <a:fld id="{32AD0C68-1C81-6148-BA97-FE9643273DE0}" type="datetime1">
               <a:rPr lang="ru-RU" smtClean="0"/>
-              <a:t>10.10.2019</a:t>
+              <a:t>11.10.2019</a:t>
             </a:fld>
             <a:endParaRPr lang="ru-RU"/>
           </a:p>
@@ -2831,7 +2831,7 @@
           <a:p>
             <a:fld id="{ED5B4937-9B2A-3B49-A229-92C09A155F1F}" type="datetime1">
               <a:rPr lang="ru-RU" smtClean="0"/>
-              <a:t>10.10.2019</a:t>
+              <a:t>11.10.2019</a:t>
             </a:fld>
             <a:endParaRPr lang="ru-RU"/>
           </a:p>
@@ -3047,7 +3047,7 @@
           <a:p>
             <a:fld id="{D1A570F3-012D-6640-87D8-43D8365EB611}" type="datetime1">
               <a:rPr lang="ru-RU" smtClean="0"/>
-              <a:t>10.10.2019</a:t>
+              <a:t>11.10.2019</a:t>
             </a:fld>
             <a:endParaRPr lang="ru-RU"/>
           </a:p>
@@ -6177,6 +6177,78 @@
           </a:p>
         </p:txBody>
       </p:sp>
+      <p:sp>
+        <p:nvSpPr>
+          <p:cNvPr id="3" name="TextBox 2">
+            <a:extLst>
+              <a:ext uri="{FF2B5EF4-FFF2-40B4-BE49-F238E27FC236}">
+                <a16:creationId xmlns:a16="http://schemas.microsoft.com/office/drawing/2014/main" id="{40F178FF-167B-BC44-A174-666D1E8913EE}"/>
+              </a:ext>
+            </a:extLst>
+          </p:cNvPr>
+          <p:cNvSpPr txBox="1"/>
+          <p:nvPr/>
+        </p:nvSpPr>
+        <p:spPr>
+          <a:xfrm>
+            <a:off x="10116486" y="3094682"/>
+            <a:ext cx="471604" cy="400110"/>
+          </a:xfrm>
+          <a:prstGeom prst="rect">
+            <a:avLst/>
+          </a:prstGeom>
+          <a:noFill/>
+        </p:spPr>
+        <p:txBody>
+          <a:bodyPr wrap="none" rtlCol="0">
+            <a:spAutoFit/>
+          </a:bodyPr>
+          <a:lstStyle/>
+          <a:p>
+            <a:r>
+              <a:rPr lang="en-US" sz="2000" dirty="0"/>
+              <a:t>(1)</a:t>
+            </a:r>
+            <a:endParaRPr lang="ru-RU" sz="2000" dirty="0"/>
+          </a:p>
+        </p:txBody>
+      </p:sp>
+      <p:sp>
+        <p:nvSpPr>
+          <p:cNvPr id="11" name="TextBox 10">
+            <a:extLst>
+              <a:ext uri="{FF2B5EF4-FFF2-40B4-BE49-F238E27FC236}">
+                <a16:creationId xmlns:a16="http://schemas.microsoft.com/office/drawing/2014/main" id="{C1D5576F-A628-D449-8EC3-ABE6EB87D11C}"/>
+              </a:ext>
+            </a:extLst>
+          </p:cNvPr>
+          <p:cNvSpPr txBox="1"/>
+          <p:nvPr/>
+        </p:nvSpPr>
+        <p:spPr>
+          <a:xfrm>
+            <a:off x="10116486" y="5176908"/>
+            <a:ext cx="468398" cy="400110"/>
+          </a:xfrm>
+          <a:prstGeom prst="rect">
+            <a:avLst/>
+          </a:prstGeom>
+          <a:noFill/>
+        </p:spPr>
+        <p:txBody>
+          <a:bodyPr wrap="none" rtlCol="0">
+            <a:spAutoFit/>
+          </a:bodyPr>
+          <a:lstStyle/>
+          <a:p>
+            <a:r>
+              <a:rPr lang="en-US" sz="2000" dirty="0"/>
+              <a:t>(2)</a:t>
+            </a:r>
+            <a:endParaRPr lang="ru-RU" sz="2000" dirty="0"/>
+          </a:p>
+        </p:txBody>
+      </p:sp>
     </p:spTree>
     <p:extLst>
       <p:ext uri="{BB962C8B-B14F-4D97-AF65-F5344CB8AC3E}">
@@ -6483,6 +6555,78 @@
           </a:p>
         </p:txBody>
       </p:sp>
+      <p:sp>
+        <p:nvSpPr>
+          <p:cNvPr id="9" name="TextBox 8">
+            <a:extLst>
+              <a:ext uri="{FF2B5EF4-FFF2-40B4-BE49-F238E27FC236}">
+                <a16:creationId xmlns:a16="http://schemas.microsoft.com/office/drawing/2014/main" id="{B92D171B-2022-4A41-A9DB-AD41B936580B}"/>
+              </a:ext>
+            </a:extLst>
+          </p:cNvPr>
+          <p:cNvSpPr txBox="1"/>
+          <p:nvPr/>
+        </p:nvSpPr>
+        <p:spPr>
+          <a:xfrm>
+            <a:off x="10000025" y="3083551"/>
+            <a:ext cx="471604" cy="400110"/>
+          </a:xfrm>
+          <a:prstGeom prst="rect">
+            <a:avLst/>
+          </a:prstGeom>
+          <a:noFill/>
+        </p:spPr>
+        <p:txBody>
+          <a:bodyPr wrap="none" rtlCol="0">
+            <a:spAutoFit/>
+          </a:bodyPr>
+          <a:lstStyle/>
+          <a:p>
+            <a:r>
+              <a:rPr lang="en-US" sz="2000" dirty="0"/>
+              <a:t>(3)</a:t>
+            </a:r>
+            <a:endParaRPr lang="ru-RU" sz="2000" dirty="0"/>
+          </a:p>
+        </p:txBody>
+      </p:sp>
+      <p:sp>
+        <p:nvSpPr>
+          <p:cNvPr id="10" name="TextBox 9">
+            <a:extLst>
+              <a:ext uri="{FF2B5EF4-FFF2-40B4-BE49-F238E27FC236}">
+                <a16:creationId xmlns:a16="http://schemas.microsoft.com/office/drawing/2014/main" id="{CFFFA7E4-4928-7047-9699-0D885D116F38}"/>
+              </a:ext>
+            </a:extLst>
+          </p:cNvPr>
+          <p:cNvSpPr txBox="1"/>
+          <p:nvPr/>
+        </p:nvSpPr>
+        <p:spPr>
+          <a:xfrm>
+            <a:off x="10000025" y="4876525"/>
+            <a:ext cx="471604" cy="400110"/>
+          </a:xfrm>
+          <a:prstGeom prst="rect">
+            <a:avLst/>
+          </a:prstGeom>
+          <a:noFill/>
+        </p:spPr>
+        <p:txBody>
+          <a:bodyPr wrap="none" rtlCol="0">
+            <a:spAutoFit/>
+          </a:bodyPr>
+          <a:lstStyle/>
+          <a:p>
+            <a:r>
+              <a:rPr lang="en-US" sz="2000" dirty="0"/>
+              <a:t>(4)</a:t>
+            </a:r>
+            <a:endParaRPr lang="ru-RU" sz="2000" dirty="0"/>
+          </a:p>
+        </p:txBody>
+      </p:sp>
     </p:spTree>
     <p:extLst>
       <p:ext uri="{BB962C8B-B14F-4D97-AF65-F5344CB8AC3E}">
@@ -6709,6 +6853,42 @@
           </a:p>
         </p:txBody>
       </p:sp>
+      <p:sp>
+        <p:nvSpPr>
+          <p:cNvPr id="7" name="TextBox 6">
+            <a:extLst>
+              <a:ext uri="{FF2B5EF4-FFF2-40B4-BE49-F238E27FC236}">
+                <a16:creationId xmlns:a16="http://schemas.microsoft.com/office/drawing/2014/main" id="{34B34637-146E-1E47-9C7B-E0E6EF29D792}"/>
+              </a:ext>
+            </a:extLst>
+          </p:cNvPr>
+          <p:cNvSpPr txBox="1"/>
+          <p:nvPr/>
+        </p:nvSpPr>
+        <p:spPr>
+          <a:xfrm>
+            <a:off x="10908625" y="3342710"/>
+            <a:ext cx="471604" cy="400110"/>
+          </a:xfrm>
+          <a:prstGeom prst="rect">
+            <a:avLst/>
+          </a:prstGeom>
+          <a:noFill/>
+        </p:spPr>
+        <p:txBody>
+          <a:bodyPr wrap="none" rtlCol="0">
+            <a:spAutoFit/>
+          </a:bodyPr>
+          <a:lstStyle/>
+          <a:p>
+            <a:r>
+              <a:rPr lang="en-US" sz="2000" dirty="0"/>
+              <a:t>(5)</a:t>
+            </a:r>
+            <a:endParaRPr lang="ru-RU" sz="2000" dirty="0"/>
+          </a:p>
+        </p:txBody>
+      </p:sp>
     </p:spTree>
     <p:extLst>
       <p:ext uri="{BB962C8B-B14F-4D97-AF65-F5344CB8AC3E}">
@@ -7008,6 +7188,78 @@
           </a:p>
         </p:txBody>
       </p:sp>
+      <p:sp>
+        <p:nvSpPr>
+          <p:cNvPr id="10" name="TextBox 9">
+            <a:extLst>
+              <a:ext uri="{FF2B5EF4-FFF2-40B4-BE49-F238E27FC236}">
+                <a16:creationId xmlns:a16="http://schemas.microsoft.com/office/drawing/2014/main" id="{1FF92C98-7473-1A49-979F-255736880281}"/>
+              </a:ext>
+            </a:extLst>
+          </p:cNvPr>
+          <p:cNvSpPr txBox="1"/>
+          <p:nvPr/>
+        </p:nvSpPr>
+        <p:spPr>
+          <a:xfrm>
+            <a:off x="9989515" y="3058080"/>
+            <a:ext cx="468398" cy="400110"/>
+          </a:xfrm>
+          <a:prstGeom prst="rect">
+            <a:avLst/>
+          </a:prstGeom>
+          <a:noFill/>
+        </p:spPr>
+        <p:txBody>
+          <a:bodyPr wrap="none" rtlCol="0">
+            <a:spAutoFit/>
+          </a:bodyPr>
+          <a:lstStyle/>
+          <a:p>
+            <a:r>
+              <a:rPr lang="en-US" sz="2000" dirty="0"/>
+              <a:t>(6)</a:t>
+            </a:r>
+            <a:endParaRPr lang="ru-RU" sz="2000" dirty="0"/>
+          </a:p>
+        </p:txBody>
+      </p:sp>
+      <p:sp>
+        <p:nvSpPr>
+          <p:cNvPr id="13" name="TextBox 12">
+            <a:extLst>
+              <a:ext uri="{FF2B5EF4-FFF2-40B4-BE49-F238E27FC236}">
+                <a16:creationId xmlns:a16="http://schemas.microsoft.com/office/drawing/2014/main" id="{29CDAD39-F6E1-944B-9FEC-F9E44C951748}"/>
+              </a:ext>
+            </a:extLst>
+          </p:cNvPr>
+          <p:cNvSpPr txBox="1"/>
+          <p:nvPr/>
+        </p:nvSpPr>
+        <p:spPr>
+          <a:xfrm>
+            <a:off x="9989515" y="5150704"/>
+            <a:ext cx="468398" cy="400110"/>
+          </a:xfrm>
+          <a:prstGeom prst="rect">
+            <a:avLst/>
+          </a:prstGeom>
+          <a:noFill/>
+        </p:spPr>
+        <p:txBody>
+          <a:bodyPr wrap="none" rtlCol="0">
+            <a:spAutoFit/>
+          </a:bodyPr>
+          <a:lstStyle/>
+          <a:p>
+            <a:r>
+              <a:rPr lang="en-US" sz="2000" dirty="0"/>
+              <a:t>(7)</a:t>
+            </a:r>
+            <a:endParaRPr lang="ru-RU" sz="2000" dirty="0"/>
+          </a:p>
+        </p:txBody>
+      </p:sp>
     </p:spTree>
     <p:extLst>
       <p:ext uri="{BB962C8B-B14F-4D97-AF65-F5344CB8AC3E}">
@@ -7299,6 +7551,78 @@
           </a:p>
         </p:txBody>
       </p:sp>
+      <p:sp>
+        <p:nvSpPr>
+          <p:cNvPr id="10" name="TextBox 9">
+            <a:extLst>
+              <a:ext uri="{FF2B5EF4-FFF2-40B4-BE49-F238E27FC236}">
+                <a16:creationId xmlns:a16="http://schemas.microsoft.com/office/drawing/2014/main" id="{F8381496-6D15-BD4A-A694-58D5C3A481E7}"/>
+              </a:ext>
+            </a:extLst>
+          </p:cNvPr>
+          <p:cNvSpPr txBox="1"/>
+          <p:nvPr/>
+        </p:nvSpPr>
+        <p:spPr>
+          <a:xfrm>
+            <a:off x="11357005" y="3005023"/>
+            <a:ext cx="468398" cy="400110"/>
+          </a:xfrm>
+          <a:prstGeom prst="rect">
+            <a:avLst/>
+          </a:prstGeom>
+          <a:noFill/>
+        </p:spPr>
+        <p:txBody>
+          <a:bodyPr wrap="none" rtlCol="0">
+            <a:spAutoFit/>
+          </a:bodyPr>
+          <a:lstStyle/>
+          <a:p>
+            <a:r>
+              <a:rPr lang="en-US" sz="2000" dirty="0"/>
+              <a:t>(8)</a:t>
+            </a:r>
+            <a:endParaRPr lang="ru-RU" sz="2000" dirty="0"/>
+          </a:p>
+        </p:txBody>
+      </p:sp>
+      <p:sp>
+        <p:nvSpPr>
+          <p:cNvPr id="13" name="TextBox 12">
+            <a:extLst>
+              <a:ext uri="{FF2B5EF4-FFF2-40B4-BE49-F238E27FC236}">
+                <a16:creationId xmlns:a16="http://schemas.microsoft.com/office/drawing/2014/main" id="{ECC0A14F-70AC-ED47-AE58-70925B54280A}"/>
+              </a:ext>
+            </a:extLst>
+          </p:cNvPr>
+          <p:cNvSpPr txBox="1"/>
+          <p:nvPr/>
+        </p:nvSpPr>
+        <p:spPr>
+          <a:xfrm>
+            <a:off x="11353799" y="5256617"/>
+            <a:ext cx="471604" cy="400110"/>
+          </a:xfrm>
+          <a:prstGeom prst="rect">
+            <a:avLst/>
+          </a:prstGeom>
+          <a:noFill/>
+        </p:spPr>
+        <p:txBody>
+          <a:bodyPr wrap="none" rtlCol="0">
+            <a:spAutoFit/>
+          </a:bodyPr>
+          <a:lstStyle/>
+          <a:p>
+            <a:r>
+              <a:rPr lang="en-US" sz="2000" dirty="0"/>
+              <a:t>(9)</a:t>
+            </a:r>
+            <a:endParaRPr lang="ru-RU" sz="2000" dirty="0"/>
+          </a:p>
+        </p:txBody>
+      </p:sp>
     </p:spTree>
     <p:extLst>
       <p:ext uri="{BB962C8B-B14F-4D97-AF65-F5344CB8AC3E}">
@@ -7521,6 +7845,42 @@
           </a:prstGeom>
         </p:spPr>
       </p:pic>
+      <p:sp>
+        <p:nvSpPr>
+          <p:cNvPr id="7" name="TextBox 6">
+            <a:extLst>
+              <a:ext uri="{FF2B5EF4-FFF2-40B4-BE49-F238E27FC236}">
+                <a16:creationId xmlns:a16="http://schemas.microsoft.com/office/drawing/2014/main" id="{3AF3D974-15EA-0C45-9916-271927580ACE}"/>
+              </a:ext>
+            </a:extLst>
+          </p:cNvPr>
+          <p:cNvSpPr txBox="1"/>
+          <p:nvPr/>
+        </p:nvSpPr>
+        <p:spPr>
+          <a:xfrm>
+            <a:off x="10525542" y="2152743"/>
+            <a:ext cx="598241" cy="400110"/>
+          </a:xfrm>
+          <a:prstGeom prst="rect">
+            <a:avLst/>
+          </a:prstGeom>
+          <a:noFill/>
+        </p:spPr>
+        <p:txBody>
+          <a:bodyPr wrap="none" rtlCol="0">
+            <a:spAutoFit/>
+          </a:bodyPr>
+          <a:lstStyle/>
+          <a:p>
+            <a:r>
+              <a:rPr lang="en-US" sz="2000" dirty="0"/>
+              <a:t>(10)</a:t>
+            </a:r>
+            <a:endParaRPr lang="ru-RU" sz="2000" dirty="0"/>
+          </a:p>
+        </p:txBody>
+      </p:sp>
     </p:spTree>
     <p:extLst>
       <p:ext uri="{BB962C8B-B14F-4D97-AF65-F5344CB8AC3E}">
@@ -8733,7 +9093,7 @@
         </p:spPr>
         <p:txBody>
           <a:bodyPr>
-            <a:normAutofit lnSpcReduction="10000"/>
+            <a:normAutofit fontScale="92500" lnSpcReduction="20000"/>
           </a:bodyPr>
           <a:lstStyle/>
           <a:p>
@@ -8779,8 +9139,33 @@
           <a:p>
             <a:r>
               <a:rPr lang="ru-RU" dirty="0"/>
-              <a:t>Создан задел для выполнения дипломного проекта</a:t>
-            </a:r>
+              <a:t>Создан задел для выполнения дипломного проекта на тему</a:t>
+            </a:r>
+            <a:r>
+              <a:rPr lang="en-US" dirty="0"/>
+              <a:t>: </a:t>
+            </a:r>
+            <a:r>
+              <a:rPr lang="ru-RU" i="1"/>
+              <a:t>«</a:t>
+            </a:r>
+            <a:r>
+              <a:rPr lang="ru-RU"/>
+              <a:t>Разработка </a:t>
+            </a:r>
+            <a:r>
+              <a:rPr lang="ru-RU" dirty="0"/>
+              <a:t>модели автоматической системы контроля радиационной обстановки (АСКРО) для полномасштабных тренажеров (</a:t>
+            </a:r>
+            <a:r>
+              <a:rPr lang="ru-RU"/>
+              <a:t>ПМТ)</a:t>
+            </a:r>
+            <a:r>
+              <a:rPr lang="ru-RU" i="1"/>
+              <a:t>»</a:t>
+            </a:r>
+            <a:endParaRPr lang="ru-RU" dirty="0"/>
           </a:p>
         </p:txBody>
       </p:sp>

</xml_diff>